<commit_message>
Actualizo automaticamente (Thu 10/23/2025)
</commit_message>
<xml_diff>
--- a/Extendend Abstract.pptx
+++ b/Extendend Abstract.pptx
@@ -9,9 +9,10 @@
     <p:sldId id="260" r:id="rId3"/>
     <p:sldId id="261" r:id="rId4"/>
     <p:sldId id="262" r:id="rId5"/>
-    <p:sldId id="263" r:id="rId6"/>
-    <p:sldId id="264" r:id="rId7"/>
-    <p:sldId id="265" r:id="rId8"/>
+    <p:sldId id="266" r:id="rId6"/>
+    <p:sldId id="263" r:id="rId7"/>
+    <p:sldId id="264" r:id="rId8"/>
+    <p:sldId id="265" r:id="rId9"/>
   </p:sldIdLst>
   <p:sldSz cx="12192000" cy="6858000"/>
   <p:notesSz cx="6858000" cy="9144000"/>
@@ -249,7 +250,7 @@
           <a:p>
             <a:fld id="{034EBBDF-5F0A-4301-B412-0CEE88DB8B49}" type="datetimeFigureOut">
               <a:rPr lang="en-US" smtClean="0"/>
-              <a:t>10/22/2025</a:t>
+              <a:t>10/23/2025</a:t>
             </a:fld>
             <a:endParaRPr lang="en-US"/>
           </a:p>
@@ -419,7 +420,7 @@
           <a:p>
             <a:fld id="{034EBBDF-5F0A-4301-B412-0CEE88DB8B49}" type="datetimeFigureOut">
               <a:rPr lang="en-US" smtClean="0"/>
-              <a:t>10/22/2025</a:t>
+              <a:t>10/23/2025</a:t>
             </a:fld>
             <a:endParaRPr lang="en-US"/>
           </a:p>
@@ -599,7 +600,7 @@
           <a:p>
             <a:fld id="{034EBBDF-5F0A-4301-B412-0CEE88DB8B49}" type="datetimeFigureOut">
               <a:rPr lang="en-US" smtClean="0"/>
-              <a:t>10/22/2025</a:t>
+              <a:t>10/23/2025</a:t>
             </a:fld>
             <a:endParaRPr lang="en-US"/>
           </a:p>
@@ -769,7 +770,7 @@
           <a:p>
             <a:fld id="{034EBBDF-5F0A-4301-B412-0CEE88DB8B49}" type="datetimeFigureOut">
               <a:rPr lang="en-US" smtClean="0"/>
-              <a:t>10/22/2025</a:t>
+              <a:t>10/23/2025</a:t>
             </a:fld>
             <a:endParaRPr lang="en-US"/>
           </a:p>
@@ -1015,7 +1016,7 @@
           <a:p>
             <a:fld id="{034EBBDF-5F0A-4301-B412-0CEE88DB8B49}" type="datetimeFigureOut">
               <a:rPr lang="en-US" smtClean="0"/>
-              <a:t>10/22/2025</a:t>
+              <a:t>10/23/2025</a:t>
             </a:fld>
             <a:endParaRPr lang="en-US"/>
           </a:p>
@@ -1247,7 +1248,7 @@
           <a:p>
             <a:fld id="{034EBBDF-5F0A-4301-B412-0CEE88DB8B49}" type="datetimeFigureOut">
               <a:rPr lang="en-US" smtClean="0"/>
-              <a:t>10/22/2025</a:t>
+              <a:t>10/23/2025</a:t>
             </a:fld>
             <a:endParaRPr lang="en-US"/>
           </a:p>
@@ -1614,7 +1615,7 @@
           <a:p>
             <a:fld id="{034EBBDF-5F0A-4301-B412-0CEE88DB8B49}" type="datetimeFigureOut">
               <a:rPr lang="en-US" smtClean="0"/>
-              <a:t>10/22/2025</a:t>
+              <a:t>10/23/2025</a:t>
             </a:fld>
             <a:endParaRPr lang="en-US"/>
           </a:p>
@@ -1732,7 +1733,7 @@
           <a:p>
             <a:fld id="{034EBBDF-5F0A-4301-B412-0CEE88DB8B49}" type="datetimeFigureOut">
               <a:rPr lang="en-US" smtClean="0"/>
-              <a:t>10/22/2025</a:t>
+              <a:t>10/23/2025</a:t>
             </a:fld>
             <a:endParaRPr lang="en-US"/>
           </a:p>
@@ -1827,7 +1828,7 @@
           <a:p>
             <a:fld id="{034EBBDF-5F0A-4301-B412-0CEE88DB8B49}" type="datetimeFigureOut">
               <a:rPr lang="en-US" smtClean="0"/>
-              <a:t>10/22/2025</a:t>
+              <a:t>10/23/2025</a:t>
             </a:fld>
             <a:endParaRPr lang="en-US"/>
           </a:p>
@@ -2104,7 +2105,7 @@
           <a:p>
             <a:fld id="{034EBBDF-5F0A-4301-B412-0CEE88DB8B49}" type="datetimeFigureOut">
               <a:rPr lang="en-US" smtClean="0"/>
-              <a:t>10/22/2025</a:t>
+              <a:t>10/23/2025</a:t>
             </a:fld>
             <a:endParaRPr lang="en-US"/>
           </a:p>
@@ -2361,7 +2362,7 @@
           <a:p>
             <a:fld id="{034EBBDF-5F0A-4301-B412-0CEE88DB8B49}" type="datetimeFigureOut">
               <a:rPr lang="en-US" smtClean="0"/>
-              <a:t>10/22/2025</a:t>
+              <a:t>10/23/2025</a:t>
             </a:fld>
             <a:endParaRPr lang="en-US"/>
           </a:p>
@@ -2574,7 +2575,7 @@
           <a:p>
             <a:fld id="{034EBBDF-5F0A-4301-B412-0CEE88DB8B49}" type="datetimeFigureOut">
               <a:rPr lang="en-US" smtClean="0"/>
-              <a:t>10/22/2025</a:t>
+              <a:t>10/23/2025</a:t>
             </a:fld>
             <a:endParaRPr lang="en-US"/>
           </a:p>
@@ -3089,7 +3090,7 @@
         </p:nvSpPr>
         <p:spPr>
           <a:xfrm>
-            <a:off x="1524000" y="1827824"/>
+            <a:off x="1524000" y="2438218"/>
             <a:ext cx="9144000" cy="1523021"/>
           </a:xfrm>
         </p:spPr>
@@ -3099,6 +3100,15 @@
           </a:bodyPr>
           <a:lstStyle/>
           <a:p>
+            <a:pPr marL="0" marR="0">
+              <a:lnSpc>
+                <a:spcPct val="115000"/>
+              </a:lnSpc>
+              <a:spcAft>
+                <a:spcPts val="800"/>
+              </a:spcAft>
+              <a:buNone/>
+            </a:pPr>
             <a:r>
               <a:rPr lang="en-US" dirty="0">
                 <a:latin typeface="Times New Roman" panose="02020603050405020304" pitchFamily="18" charset="0"/>
@@ -3113,47 +3123,55 @@
               </a:rPr>
             </a:br>
             <a:r>
-              <a:rPr lang="es-ES" sz="2400" dirty="0">
-                <a:latin typeface="Times New Roman" panose="02020603050405020304" pitchFamily="18" charset="0"/>
-                <a:cs typeface="Times New Roman" panose="02020603050405020304" pitchFamily="18" charset="0"/>
-              </a:rPr>
-              <a:t>Asistencia y Mejora de Búsquedas en </a:t>
-            </a:r>
-            <a:r>
-              <a:rPr lang="es-ES" sz="2400" dirty="0" err="1">
+              <a:rPr lang="es-ES" sz="2700" dirty="0">
+                <a:latin typeface="Times New Roman" panose="02020603050405020304" pitchFamily="18" charset="0"/>
+                <a:cs typeface="Times New Roman" panose="02020603050405020304" pitchFamily="18" charset="0"/>
+              </a:rPr>
+              <a:t>Construcción de conocimiento sobre </a:t>
+            </a:r>
+            <a:r>
+              <a:rPr lang="es-ES" sz="2700" dirty="0" err="1">
                 <a:latin typeface="Times New Roman" panose="02020603050405020304" pitchFamily="18" charset="0"/>
                 <a:cs typeface="Times New Roman" panose="02020603050405020304" pitchFamily="18" charset="0"/>
               </a:rPr>
               <a:t>Hugging</a:t>
             </a:r>
             <a:r>
-              <a:rPr lang="es-ES" sz="2400" dirty="0">
+              <a:rPr lang="es-ES" sz="2700" dirty="0">
                 <a:latin typeface="Times New Roman" panose="02020603050405020304" pitchFamily="18" charset="0"/>
                 <a:cs typeface="Times New Roman" panose="02020603050405020304" pitchFamily="18" charset="0"/>
               </a:rPr>
               <a:t> </a:t>
             </a:r>
             <a:r>
-              <a:rPr lang="es-ES" sz="2400" dirty="0" err="1">
+              <a:rPr lang="es-ES" sz="2700" dirty="0" err="1">
                 <a:latin typeface="Times New Roman" panose="02020603050405020304" pitchFamily="18" charset="0"/>
                 <a:cs typeface="Times New Roman" panose="02020603050405020304" pitchFamily="18" charset="0"/>
               </a:rPr>
               <a:t>Face</a:t>
             </a:r>
             <a:r>
-              <a:rPr lang="es-ES" sz="2400" dirty="0">
-                <a:latin typeface="Times New Roman" panose="02020603050405020304" pitchFamily="18" charset="0"/>
-                <a:cs typeface="Times New Roman" panose="02020603050405020304" pitchFamily="18" charset="0"/>
-              </a:rPr>
-              <a:t> mediante el uso de </a:t>
-            </a:r>
-            <a:r>
-              <a:rPr lang="es-ES" sz="2400" dirty="0" err="1">
+              <a:rPr lang="es-ES" sz="2700" dirty="0">
+                <a:latin typeface="Times New Roman" panose="02020603050405020304" pitchFamily="18" charset="0"/>
+                <a:cs typeface="Times New Roman" panose="02020603050405020304" pitchFamily="18" charset="0"/>
+              </a:rPr>
+              <a:t> usando </a:t>
+            </a:r>
+            <a:r>
+              <a:rPr lang="es-ES" sz="2700" dirty="0" err="1">
                 <a:latin typeface="Times New Roman" panose="02020603050405020304" pitchFamily="18" charset="0"/>
                 <a:cs typeface="Times New Roman" panose="02020603050405020304" pitchFamily="18" charset="0"/>
               </a:rPr>
               <a:t>GraphRAG</a:t>
             </a:r>
+            <a:br>
+              <a:rPr lang="en-US" sz="1400" kern="100" dirty="0">
+                <a:effectLst/>
+                <a:latin typeface="Aptos" panose="020B0004020202020204" pitchFamily="34" charset="0"/>
+                <a:ea typeface="Aptos" panose="020B0004020202020204" pitchFamily="34" charset="0"/>
+                <a:cs typeface="Aptos" panose="020B0004020202020204" pitchFamily="34" charset="0"/>
+              </a:rPr>
+            </a:br>
             <a:endParaRPr lang="en-US" dirty="0">
               <a:latin typeface="Times New Roman" panose="02020603050405020304" pitchFamily="18" charset="0"/>
               <a:cs typeface="Times New Roman" panose="02020603050405020304" pitchFamily="18" charset="0"/>
@@ -5890,258 +5908,6 @@
       </p:sp>
       <p:sp>
         <p:nvSpPr>
-          <p:cNvPr id="9" name="Subtitle 2">
-            <a:extLst>
-              <a:ext uri="{FF2B5EF4-FFF2-40B4-BE49-F238E27FC236}">
-                <a16:creationId xmlns:a16="http://schemas.microsoft.com/office/drawing/2014/main" id="{3C0F8C12-F88F-7573-A0B9-7D208598B43C}"/>
-              </a:ext>
-            </a:extLst>
-          </p:cNvPr>
-          <p:cNvSpPr txBox="1">
-            <a:spLocks/>
-          </p:cNvSpPr>
-          <p:nvPr/>
-        </p:nvSpPr>
-        <p:spPr>
-          <a:xfrm>
-            <a:off x="602809" y="5406501"/>
-            <a:ext cx="9144000" cy="1043187"/>
-          </a:xfrm>
-          <a:prstGeom prst="rect">
-            <a:avLst/>
-          </a:prstGeom>
-        </p:spPr>
-        <p:txBody>
-          <a:bodyPr vert="horz" lIns="91440" tIns="45720" rIns="91440" bIns="45720" rtlCol="0">
-            <a:noAutofit/>
-          </a:bodyPr>
-          <a:lstStyle>
-            <a:lvl1pPr marL="0" indent="0" algn="ctr" defTabSz="914400" rtl="0" eaLnBrk="1" latinLnBrk="0" hangingPunct="1">
-              <a:lnSpc>
-                <a:spcPct val="90000"/>
-              </a:lnSpc>
-              <a:spcBef>
-                <a:spcPts val="1000"/>
-              </a:spcBef>
-              <a:buFont typeface="Arial" panose="020B0604020202020204" pitchFamily="34" charset="0"/>
-              <a:buNone/>
-              <a:defRPr sz="2400" kern="1200">
-                <a:solidFill>
-                  <a:schemeClr val="tx1"/>
-                </a:solidFill>
-                <a:latin typeface="+mn-lt"/>
-                <a:ea typeface="+mn-ea"/>
-                <a:cs typeface="+mn-cs"/>
-              </a:defRPr>
-            </a:lvl1pPr>
-            <a:lvl2pPr marL="457200" indent="0" algn="ctr" defTabSz="914400" rtl="0" eaLnBrk="1" latinLnBrk="0" hangingPunct="1">
-              <a:lnSpc>
-                <a:spcPct val="90000"/>
-              </a:lnSpc>
-              <a:spcBef>
-                <a:spcPts val="500"/>
-              </a:spcBef>
-              <a:buFont typeface="Arial" panose="020B0604020202020204" pitchFamily="34" charset="0"/>
-              <a:buNone/>
-              <a:defRPr sz="2000" kern="1200">
-                <a:solidFill>
-                  <a:schemeClr val="tx1"/>
-                </a:solidFill>
-                <a:latin typeface="+mn-lt"/>
-                <a:ea typeface="+mn-ea"/>
-                <a:cs typeface="+mn-cs"/>
-              </a:defRPr>
-            </a:lvl2pPr>
-            <a:lvl3pPr marL="914400" indent="0" algn="ctr" defTabSz="914400" rtl="0" eaLnBrk="1" latinLnBrk="0" hangingPunct="1">
-              <a:lnSpc>
-                <a:spcPct val="90000"/>
-              </a:lnSpc>
-              <a:spcBef>
-                <a:spcPts val="500"/>
-              </a:spcBef>
-              <a:buFont typeface="Arial" panose="020B0604020202020204" pitchFamily="34" charset="0"/>
-              <a:buNone/>
-              <a:defRPr sz="1800" kern="1200">
-                <a:solidFill>
-                  <a:schemeClr val="tx1"/>
-                </a:solidFill>
-                <a:latin typeface="+mn-lt"/>
-                <a:ea typeface="+mn-ea"/>
-                <a:cs typeface="+mn-cs"/>
-              </a:defRPr>
-            </a:lvl3pPr>
-            <a:lvl4pPr marL="1371600" indent="0" algn="ctr" defTabSz="914400" rtl="0" eaLnBrk="1" latinLnBrk="0" hangingPunct="1">
-              <a:lnSpc>
-                <a:spcPct val="90000"/>
-              </a:lnSpc>
-              <a:spcBef>
-                <a:spcPts val="500"/>
-              </a:spcBef>
-              <a:buFont typeface="Arial" panose="020B0604020202020204" pitchFamily="34" charset="0"/>
-              <a:buNone/>
-              <a:defRPr sz="1600" kern="1200">
-                <a:solidFill>
-                  <a:schemeClr val="tx1"/>
-                </a:solidFill>
-                <a:latin typeface="+mn-lt"/>
-                <a:ea typeface="+mn-ea"/>
-                <a:cs typeface="+mn-cs"/>
-              </a:defRPr>
-            </a:lvl4pPr>
-            <a:lvl5pPr marL="1828800" indent="0" algn="ctr" defTabSz="914400" rtl="0" eaLnBrk="1" latinLnBrk="0" hangingPunct="1">
-              <a:lnSpc>
-                <a:spcPct val="90000"/>
-              </a:lnSpc>
-              <a:spcBef>
-                <a:spcPts val="500"/>
-              </a:spcBef>
-              <a:buFont typeface="Arial" panose="020B0604020202020204" pitchFamily="34" charset="0"/>
-              <a:buNone/>
-              <a:defRPr sz="1600" kern="1200">
-                <a:solidFill>
-                  <a:schemeClr val="tx1"/>
-                </a:solidFill>
-                <a:latin typeface="+mn-lt"/>
-                <a:ea typeface="+mn-ea"/>
-                <a:cs typeface="+mn-cs"/>
-              </a:defRPr>
-            </a:lvl5pPr>
-            <a:lvl6pPr marL="2286000" indent="0" algn="ctr" defTabSz="914400" rtl="0" eaLnBrk="1" latinLnBrk="0" hangingPunct="1">
-              <a:lnSpc>
-                <a:spcPct val="90000"/>
-              </a:lnSpc>
-              <a:spcBef>
-                <a:spcPts val="500"/>
-              </a:spcBef>
-              <a:buFont typeface="Arial" panose="020B0604020202020204" pitchFamily="34" charset="0"/>
-              <a:buNone/>
-              <a:defRPr sz="1600" kern="1200">
-                <a:solidFill>
-                  <a:schemeClr val="tx1"/>
-                </a:solidFill>
-                <a:latin typeface="+mn-lt"/>
-                <a:ea typeface="+mn-ea"/>
-                <a:cs typeface="+mn-cs"/>
-              </a:defRPr>
-            </a:lvl6pPr>
-            <a:lvl7pPr marL="2743200" indent="0" algn="ctr" defTabSz="914400" rtl="0" eaLnBrk="1" latinLnBrk="0" hangingPunct="1">
-              <a:lnSpc>
-                <a:spcPct val="90000"/>
-              </a:lnSpc>
-              <a:spcBef>
-                <a:spcPts val="500"/>
-              </a:spcBef>
-              <a:buFont typeface="Arial" panose="020B0604020202020204" pitchFamily="34" charset="0"/>
-              <a:buNone/>
-              <a:defRPr sz="1600" kern="1200">
-                <a:solidFill>
-                  <a:schemeClr val="tx1"/>
-                </a:solidFill>
-                <a:latin typeface="+mn-lt"/>
-                <a:ea typeface="+mn-ea"/>
-                <a:cs typeface="+mn-cs"/>
-              </a:defRPr>
-            </a:lvl7pPr>
-            <a:lvl8pPr marL="3200400" indent="0" algn="ctr" defTabSz="914400" rtl="0" eaLnBrk="1" latinLnBrk="0" hangingPunct="1">
-              <a:lnSpc>
-                <a:spcPct val="90000"/>
-              </a:lnSpc>
-              <a:spcBef>
-                <a:spcPts val="500"/>
-              </a:spcBef>
-              <a:buFont typeface="Arial" panose="020B0604020202020204" pitchFamily="34" charset="0"/>
-              <a:buNone/>
-              <a:defRPr sz="1600" kern="1200">
-                <a:solidFill>
-                  <a:schemeClr val="tx1"/>
-                </a:solidFill>
-                <a:latin typeface="+mn-lt"/>
-                <a:ea typeface="+mn-ea"/>
-                <a:cs typeface="+mn-cs"/>
-              </a:defRPr>
-            </a:lvl8pPr>
-            <a:lvl9pPr marL="3657600" indent="0" algn="ctr" defTabSz="914400" rtl="0" eaLnBrk="1" latinLnBrk="0" hangingPunct="1">
-              <a:lnSpc>
-                <a:spcPct val="90000"/>
-              </a:lnSpc>
-              <a:spcBef>
-                <a:spcPts val="500"/>
-              </a:spcBef>
-              <a:buFont typeface="Arial" panose="020B0604020202020204" pitchFamily="34" charset="0"/>
-              <a:buNone/>
-              <a:defRPr sz="1600" kern="1200">
-                <a:solidFill>
-                  <a:schemeClr val="tx1"/>
-                </a:solidFill>
-                <a:latin typeface="+mn-lt"/>
-                <a:ea typeface="+mn-ea"/>
-                <a:cs typeface="+mn-cs"/>
-              </a:defRPr>
-            </a:lvl9pPr>
-          </a:lstStyle>
-          <a:p>
-            <a:pPr marL="285750" indent="-285750" algn="l">
-              <a:buFont typeface="Arial" panose="020B0604020202020204" pitchFamily="34" charset="0"/>
-              <a:buChar char="•"/>
-            </a:pPr>
-            <a:r>
-              <a:rPr lang="es-ES" sz="1600" dirty="0">
-                <a:latin typeface="Times New Roman" panose="02020603050405020304" pitchFamily="18" charset="0"/>
-                <a:cs typeface="Times New Roman" panose="02020603050405020304" pitchFamily="18" charset="0"/>
-              </a:rPr>
-              <a:t>Diseñar e implementar un sistema de consultas en lenguaje natural sobre la base de datos </a:t>
-            </a:r>
-            <a:r>
-              <a:rPr lang="es-ES" sz="1600" dirty="0" err="1">
-                <a:latin typeface="Times New Roman" panose="02020603050405020304" pitchFamily="18" charset="0"/>
-                <a:cs typeface="Times New Roman" panose="02020603050405020304" pitchFamily="18" charset="0"/>
-              </a:rPr>
-              <a:t>Hugging</a:t>
-            </a:r>
-            <a:r>
-              <a:rPr lang="es-ES" sz="1600" dirty="0">
-                <a:latin typeface="Times New Roman" panose="02020603050405020304" pitchFamily="18" charset="0"/>
-                <a:cs typeface="Times New Roman" panose="02020603050405020304" pitchFamily="18" charset="0"/>
-              </a:rPr>
-              <a:t> </a:t>
-            </a:r>
-            <a:r>
-              <a:rPr lang="es-ES" sz="1600" dirty="0" err="1">
-                <a:latin typeface="Times New Roman" panose="02020603050405020304" pitchFamily="18" charset="0"/>
-                <a:cs typeface="Times New Roman" panose="02020603050405020304" pitchFamily="18" charset="0"/>
-              </a:rPr>
-              <a:t>Face</a:t>
-            </a:r>
-            <a:r>
-              <a:rPr lang="es-ES" sz="1600" dirty="0">
-                <a:latin typeface="Times New Roman" panose="02020603050405020304" pitchFamily="18" charset="0"/>
-                <a:cs typeface="Times New Roman" panose="02020603050405020304" pitchFamily="18" charset="0"/>
-              </a:rPr>
-              <a:t> utilizando la tecnología </a:t>
-            </a:r>
-            <a:r>
-              <a:rPr lang="es-ES" sz="1600" dirty="0" err="1">
-                <a:latin typeface="Times New Roman" panose="02020603050405020304" pitchFamily="18" charset="0"/>
-                <a:cs typeface="Times New Roman" panose="02020603050405020304" pitchFamily="18" charset="0"/>
-              </a:rPr>
-              <a:t>GraphRAG</a:t>
-            </a:r>
-            <a:r>
-              <a:rPr lang="es-ES" sz="1600" dirty="0">
-                <a:latin typeface="Times New Roman" panose="02020603050405020304" pitchFamily="18" charset="0"/>
-                <a:cs typeface="Times New Roman" panose="02020603050405020304" pitchFamily="18" charset="0"/>
-              </a:rPr>
-              <a:t>, integrando diagramas de conocimiento y modelos de lenguaje de gran alcance (LLM), con el fin de mejorar la precisión y reducir las alucinaciones en la consulta de información. </a:t>
-            </a:r>
-            <a:endParaRPr lang="en-US" sz="1600" dirty="0">
-              <a:latin typeface="Times New Roman" panose="02020603050405020304" pitchFamily="18" charset="0"/>
-              <a:cs typeface="Times New Roman" panose="02020603050405020304" pitchFamily="18" charset="0"/>
-            </a:endParaRPr>
-          </a:p>
-        </p:txBody>
-      </p:sp>
-      <p:sp>
-        <p:nvSpPr>
           <p:cNvPr id="2" name="Title 1">
             <a:extLst>
               <a:ext uri="{FF2B5EF4-FFF2-40B4-BE49-F238E27FC236}">
@@ -6156,7 +5922,7 @@
         </p:nvSpPr>
         <p:spPr>
           <a:xfrm>
-            <a:off x="602809" y="902350"/>
+            <a:off x="602809" y="764689"/>
             <a:ext cx="1857588" cy="389947"/>
           </a:xfrm>
           <a:prstGeom prst="rect">
@@ -6200,63 +5966,6 @@
                 <a:cs typeface="Times New Roman" panose="02020603050405020304" pitchFamily="18" charset="0"/>
               </a:rPr>
               <a:t>:</a:t>
-            </a:r>
-          </a:p>
-        </p:txBody>
-      </p:sp>
-      <p:sp>
-        <p:nvSpPr>
-          <p:cNvPr id="3" name="Title 1">
-            <a:extLst>
-              <a:ext uri="{FF2B5EF4-FFF2-40B4-BE49-F238E27FC236}">
-                <a16:creationId xmlns:a16="http://schemas.microsoft.com/office/drawing/2014/main" id="{3D4E028C-3650-1C72-BA85-8A0855E0AF5C}"/>
-              </a:ext>
-            </a:extLst>
-          </p:cNvPr>
-          <p:cNvSpPr txBox="1">
-            <a:spLocks/>
-          </p:cNvSpPr>
-          <p:nvPr/>
-        </p:nvSpPr>
-        <p:spPr>
-          <a:xfrm>
-            <a:off x="602809" y="4978572"/>
-            <a:ext cx="1857588" cy="389947"/>
-          </a:xfrm>
-          <a:prstGeom prst="rect">
-            <a:avLst/>
-          </a:prstGeom>
-        </p:spPr>
-        <p:txBody>
-          <a:bodyPr vert="horz" lIns="91440" tIns="45720" rIns="91440" bIns="45720" rtlCol="0" anchor="ctr">
-            <a:normAutofit fontScale="92500" lnSpcReduction="20000"/>
-          </a:bodyPr>
-          <a:lstStyle>
-            <a:lvl1pPr algn="l" defTabSz="914400" rtl="0" eaLnBrk="1" latinLnBrk="0" hangingPunct="1">
-              <a:lnSpc>
-                <a:spcPct val="90000"/>
-              </a:lnSpc>
-              <a:spcBef>
-                <a:spcPct val="0"/>
-              </a:spcBef>
-              <a:buNone/>
-              <a:defRPr sz="4400" kern="1200">
-                <a:solidFill>
-                  <a:schemeClr val="tx1"/>
-                </a:solidFill>
-                <a:latin typeface="+mj-lt"/>
-                <a:ea typeface="+mj-ea"/>
-                <a:cs typeface="+mj-cs"/>
-              </a:defRPr>
-            </a:lvl1pPr>
-          </a:lstStyle>
-          <a:p>
-            <a:r>
-              <a:rPr lang="en-US" sz="2800" dirty="0">
-                <a:latin typeface="Times New Roman" panose="02020603050405020304" pitchFamily="18" charset="0"/>
-                <a:cs typeface="Times New Roman" panose="02020603050405020304" pitchFamily="18" charset="0"/>
-              </a:rPr>
-              <a:t>General:</a:t>
             </a:r>
           </a:p>
         </p:txBody>
@@ -6275,8 +5984,8 @@
         </p:nvSpPr>
         <p:spPr>
           <a:xfrm>
-            <a:off x="602809" y="1264983"/>
-            <a:ext cx="11030892" cy="4031873"/>
+            <a:off x="602809" y="1154636"/>
+            <a:ext cx="11030892" cy="3785652"/>
           </a:xfrm>
           <a:prstGeom prst="rect">
             <a:avLst/>
@@ -6289,334 +5998,6 @@
           </a:bodyPr>
           <a:lstStyle/>
           <a:p>
-            <a:pPr marL="285750" indent="-285750">
-              <a:buFont typeface="Arial" panose="020B0604020202020204" pitchFamily="34" charset="0"/>
-              <a:buChar char="•"/>
-            </a:pPr>
-            <a:r>
-              <a:rPr lang="en-US" sz="1600" dirty="0" err="1">
-                <a:latin typeface="Times New Roman" panose="02020603050405020304" pitchFamily="18" charset="0"/>
-                <a:cs typeface="Times New Roman" panose="02020603050405020304" pitchFamily="18" charset="0"/>
-              </a:rPr>
-              <a:t>Extraer</a:t>
-            </a:r>
-            <a:r>
-              <a:rPr lang="en-US" sz="1600" dirty="0">
-                <a:latin typeface="Times New Roman" panose="02020603050405020304" pitchFamily="18" charset="0"/>
-                <a:cs typeface="Times New Roman" panose="02020603050405020304" pitchFamily="18" charset="0"/>
-              </a:rPr>
-              <a:t> y </a:t>
-            </a:r>
-            <a:r>
-              <a:rPr lang="en-US" sz="1600" dirty="0" err="1">
-                <a:latin typeface="Times New Roman" panose="02020603050405020304" pitchFamily="18" charset="0"/>
-                <a:cs typeface="Times New Roman" panose="02020603050405020304" pitchFamily="18" charset="0"/>
-              </a:rPr>
-              <a:t>procesar</a:t>
-            </a:r>
-            <a:r>
-              <a:rPr lang="en-US" sz="1600" dirty="0">
-                <a:latin typeface="Times New Roman" panose="02020603050405020304" pitchFamily="18" charset="0"/>
-                <a:cs typeface="Times New Roman" panose="02020603050405020304" pitchFamily="18" charset="0"/>
-              </a:rPr>
-              <a:t> </a:t>
-            </a:r>
-            <a:r>
-              <a:rPr lang="en-US" sz="1600" dirty="0" err="1">
-                <a:latin typeface="Times New Roman" panose="02020603050405020304" pitchFamily="18" charset="0"/>
-                <a:cs typeface="Times New Roman" panose="02020603050405020304" pitchFamily="18" charset="0"/>
-              </a:rPr>
-              <a:t>el</a:t>
-            </a:r>
-            <a:r>
-              <a:rPr lang="en-US" sz="1600" dirty="0">
-                <a:latin typeface="Times New Roman" panose="02020603050405020304" pitchFamily="18" charset="0"/>
-                <a:cs typeface="Times New Roman" panose="02020603050405020304" pitchFamily="18" charset="0"/>
-              </a:rPr>
-              <a:t> </a:t>
-            </a:r>
-            <a:r>
-              <a:rPr lang="en-US" sz="1600" dirty="0" err="1">
-                <a:latin typeface="Times New Roman" panose="02020603050405020304" pitchFamily="18" charset="0"/>
-                <a:cs typeface="Times New Roman" panose="02020603050405020304" pitchFamily="18" charset="0"/>
-              </a:rPr>
-              <a:t>archivo</a:t>
-            </a:r>
-            <a:r>
-              <a:rPr lang="en-US" sz="1600" dirty="0">
-                <a:latin typeface="Times New Roman" panose="02020603050405020304" pitchFamily="18" charset="0"/>
-                <a:cs typeface="Times New Roman" panose="02020603050405020304" pitchFamily="18" charset="0"/>
-              </a:rPr>
-              <a:t> de </a:t>
-            </a:r>
-            <a:r>
-              <a:rPr lang="en-US" sz="1600" dirty="0" err="1">
-                <a:latin typeface="Times New Roman" panose="02020603050405020304" pitchFamily="18" charset="0"/>
-                <a:cs typeface="Times New Roman" panose="02020603050405020304" pitchFamily="18" charset="0"/>
-              </a:rPr>
-              <a:t>almacenamiento</a:t>
-            </a:r>
-            <a:r>
-              <a:rPr lang="en-US" sz="1600" dirty="0">
-                <a:latin typeface="Times New Roman" panose="02020603050405020304" pitchFamily="18" charset="0"/>
-                <a:cs typeface="Times New Roman" panose="02020603050405020304" pitchFamily="18" charset="0"/>
-              </a:rPr>
-              <a:t> temporal (Dump File - 23,8 GB) de Hugging Face </a:t>
-            </a:r>
-            <a:r>
-              <a:rPr lang="en-US" sz="1600" dirty="0" err="1">
-                <a:latin typeface="Times New Roman" panose="02020603050405020304" pitchFamily="18" charset="0"/>
-                <a:cs typeface="Times New Roman" panose="02020603050405020304" pitchFamily="18" charset="0"/>
-              </a:rPr>
-              <a:t>descrito</a:t>
-            </a:r>
-            <a:r>
-              <a:rPr lang="en-US" sz="1600" dirty="0">
-                <a:latin typeface="Times New Roman" panose="02020603050405020304" pitchFamily="18" charset="0"/>
-                <a:cs typeface="Times New Roman" panose="02020603050405020304" pitchFamily="18" charset="0"/>
-              </a:rPr>
-              <a:t> </a:t>
-            </a:r>
-            <a:r>
-              <a:rPr lang="en-US" sz="1600" dirty="0" err="1">
-                <a:latin typeface="Times New Roman" panose="02020603050405020304" pitchFamily="18" charset="0"/>
-                <a:cs typeface="Times New Roman" panose="02020603050405020304" pitchFamily="18" charset="0"/>
-              </a:rPr>
-              <a:t>en</a:t>
-            </a:r>
-            <a:r>
-              <a:rPr lang="en-US" sz="1600" dirty="0">
-                <a:latin typeface="Times New Roman" panose="02020603050405020304" pitchFamily="18" charset="0"/>
-                <a:cs typeface="Times New Roman" panose="02020603050405020304" pitchFamily="18" charset="0"/>
-              </a:rPr>
-              <a:t> </a:t>
-            </a:r>
-            <a:r>
-              <a:rPr lang="en-US" sz="1600" b="1" dirty="0">
-                <a:latin typeface="Times New Roman" panose="02020603050405020304" pitchFamily="18" charset="0"/>
-                <a:cs typeface="Times New Roman" panose="02020603050405020304" pitchFamily="18" charset="0"/>
-              </a:rPr>
-              <a:t>“</a:t>
-            </a:r>
-            <a:r>
-              <a:rPr lang="en-US" sz="1600" b="1" dirty="0" err="1">
-                <a:latin typeface="Times New Roman" panose="02020603050405020304" pitchFamily="18" charset="0"/>
-                <a:cs typeface="Times New Roman" panose="02020603050405020304" pitchFamily="18" charset="0"/>
-              </a:rPr>
-              <a:t>HFCommunity</a:t>
-            </a:r>
-            <a:r>
-              <a:rPr lang="en-US" sz="1600" b="1" dirty="0">
-                <a:latin typeface="Times New Roman" panose="02020603050405020304" pitchFamily="18" charset="0"/>
-                <a:cs typeface="Times New Roman" panose="02020603050405020304" pitchFamily="18" charset="0"/>
-              </a:rPr>
-              <a:t>: An extraction process and relational database to analyze Hugging Face Hub data” (</a:t>
-            </a:r>
-            <a:r>
-              <a:rPr lang="en-US" sz="1600" b="1" dirty="0" err="1">
-                <a:latin typeface="Times New Roman" panose="02020603050405020304" pitchFamily="18" charset="0"/>
-                <a:cs typeface="Times New Roman" panose="02020603050405020304" pitchFamily="18" charset="0"/>
-              </a:rPr>
-              <a:t>Ait</a:t>
-            </a:r>
-            <a:r>
-              <a:rPr lang="en-US" sz="1600" b="1" dirty="0">
-                <a:latin typeface="Times New Roman" panose="02020603050405020304" pitchFamily="18" charset="0"/>
-                <a:cs typeface="Times New Roman" panose="02020603050405020304" pitchFamily="18" charset="0"/>
-              </a:rPr>
-              <a:t> et al, 2024) [3]</a:t>
-            </a:r>
-            <a:r>
-              <a:rPr lang="en-US" sz="1600" dirty="0">
-                <a:latin typeface="Times New Roman" panose="02020603050405020304" pitchFamily="18" charset="0"/>
-                <a:cs typeface="Times New Roman" panose="02020603050405020304" pitchFamily="18" charset="0"/>
-              </a:rPr>
-              <a:t> para  </a:t>
-            </a:r>
-            <a:r>
-              <a:rPr lang="en-US" sz="1600" dirty="0" err="1">
-                <a:latin typeface="Times New Roman" panose="02020603050405020304" pitchFamily="18" charset="0"/>
-                <a:cs typeface="Times New Roman" panose="02020603050405020304" pitchFamily="18" charset="0"/>
-              </a:rPr>
-              <a:t>generar</a:t>
-            </a:r>
-            <a:r>
-              <a:rPr lang="en-US" sz="1600" dirty="0">
-                <a:latin typeface="Times New Roman" panose="02020603050405020304" pitchFamily="18" charset="0"/>
-                <a:cs typeface="Times New Roman" panose="02020603050405020304" pitchFamily="18" charset="0"/>
-              </a:rPr>
-              <a:t> un </a:t>
-            </a:r>
-            <a:r>
-              <a:rPr lang="en-US" sz="1600" dirty="0" err="1">
-                <a:latin typeface="Times New Roman" panose="02020603050405020304" pitchFamily="18" charset="0"/>
-                <a:cs typeface="Times New Roman" panose="02020603050405020304" pitchFamily="18" charset="0"/>
-              </a:rPr>
-              <a:t>grafo</a:t>
-            </a:r>
-            <a:r>
-              <a:rPr lang="en-US" sz="1600" dirty="0">
-                <a:latin typeface="Times New Roman" panose="02020603050405020304" pitchFamily="18" charset="0"/>
-                <a:cs typeface="Times New Roman" panose="02020603050405020304" pitchFamily="18" charset="0"/>
-              </a:rPr>
-              <a:t> de </a:t>
-            </a:r>
-            <a:r>
-              <a:rPr lang="en-US" sz="1600" dirty="0" err="1">
-                <a:latin typeface="Times New Roman" panose="02020603050405020304" pitchFamily="18" charset="0"/>
-                <a:cs typeface="Times New Roman" panose="02020603050405020304" pitchFamily="18" charset="0"/>
-              </a:rPr>
-              <a:t>conocimiento</a:t>
-            </a:r>
-            <a:r>
-              <a:rPr lang="en-US" sz="1600" dirty="0">
-                <a:latin typeface="Times New Roman" panose="02020603050405020304" pitchFamily="18" charset="0"/>
-                <a:cs typeface="Times New Roman" panose="02020603050405020304" pitchFamily="18" charset="0"/>
-              </a:rPr>
-              <a:t> </a:t>
-            </a:r>
-            <a:r>
-              <a:rPr lang="en-US" sz="1600" dirty="0" err="1">
-                <a:latin typeface="Times New Roman" panose="02020603050405020304" pitchFamily="18" charset="0"/>
-                <a:cs typeface="Times New Roman" panose="02020603050405020304" pitchFamily="18" charset="0"/>
-              </a:rPr>
-              <a:t>representando</a:t>
-            </a:r>
-            <a:r>
-              <a:rPr lang="en-US" sz="1600" dirty="0">
-                <a:latin typeface="Times New Roman" panose="02020603050405020304" pitchFamily="18" charset="0"/>
-                <a:cs typeface="Times New Roman" panose="02020603050405020304" pitchFamily="18" charset="0"/>
-              </a:rPr>
-              <a:t> las </a:t>
-            </a:r>
-            <a:r>
-              <a:rPr lang="en-US" sz="1600" dirty="0" err="1">
-                <a:latin typeface="Times New Roman" panose="02020603050405020304" pitchFamily="18" charset="0"/>
-                <a:cs typeface="Times New Roman" panose="02020603050405020304" pitchFamily="18" charset="0"/>
-              </a:rPr>
-              <a:t>entidades</a:t>
-            </a:r>
-            <a:r>
-              <a:rPr lang="en-US" sz="1600" dirty="0">
-                <a:latin typeface="Times New Roman" panose="02020603050405020304" pitchFamily="18" charset="0"/>
-                <a:cs typeface="Times New Roman" panose="02020603050405020304" pitchFamily="18" charset="0"/>
-              </a:rPr>
-              <a:t> </a:t>
-            </a:r>
-            <a:r>
-              <a:rPr lang="en-US" sz="1600" dirty="0" err="1">
-                <a:latin typeface="Times New Roman" panose="02020603050405020304" pitchFamily="18" charset="0"/>
-                <a:cs typeface="Times New Roman" panose="02020603050405020304" pitchFamily="18" charset="0"/>
-              </a:rPr>
-              <a:t>relevantes</a:t>
-            </a:r>
-            <a:r>
-              <a:rPr lang="en-US" sz="1600" dirty="0">
-                <a:latin typeface="Times New Roman" panose="02020603050405020304" pitchFamily="18" charset="0"/>
-                <a:cs typeface="Times New Roman" panose="02020603050405020304" pitchFamily="18" charset="0"/>
-              </a:rPr>
-              <a:t> (</a:t>
-            </a:r>
-            <a:r>
-              <a:rPr lang="en-US" sz="1600" dirty="0" err="1">
-                <a:latin typeface="Times New Roman" panose="02020603050405020304" pitchFamily="18" charset="0"/>
-                <a:cs typeface="Times New Roman" panose="02020603050405020304" pitchFamily="18" charset="0"/>
-              </a:rPr>
-              <a:t>modelos</a:t>
-            </a:r>
-            <a:r>
-              <a:rPr lang="en-US" sz="1600" dirty="0">
-                <a:latin typeface="Times New Roman" panose="02020603050405020304" pitchFamily="18" charset="0"/>
-                <a:cs typeface="Times New Roman" panose="02020603050405020304" pitchFamily="18" charset="0"/>
-              </a:rPr>
-              <a:t>, conjuntos de </a:t>
-            </a:r>
-            <a:r>
-              <a:rPr lang="en-US" sz="1600" dirty="0" err="1">
-                <a:latin typeface="Times New Roman" panose="02020603050405020304" pitchFamily="18" charset="0"/>
-                <a:cs typeface="Times New Roman" panose="02020603050405020304" pitchFamily="18" charset="0"/>
-              </a:rPr>
-              <a:t>datos</a:t>
-            </a:r>
-            <a:r>
-              <a:rPr lang="en-US" sz="1600" dirty="0">
-                <a:latin typeface="Times New Roman" panose="02020603050405020304" pitchFamily="18" charset="0"/>
-                <a:cs typeface="Times New Roman" panose="02020603050405020304" pitchFamily="18" charset="0"/>
-              </a:rPr>
-              <a:t>, </a:t>
-            </a:r>
-            <a:r>
-              <a:rPr lang="en-US" sz="1600" dirty="0" err="1">
-                <a:latin typeface="Times New Roman" panose="02020603050405020304" pitchFamily="18" charset="0"/>
-                <a:cs typeface="Times New Roman" panose="02020603050405020304" pitchFamily="18" charset="0"/>
-              </a:rPr>
-              <a:t>autores</a:t>
-            </a:r>
-            <a:r>
-              <a:rPr lang="en-US" sz="1600" dirty="0">
-                <a:latin typeface="Times New Roman" panose="02020603050405020304" pitchFamily="18" charset="0"/>
-                <a:cs typeface="Times New Roman" panose="02020603050405020304" pitchFamily="18" charset="0"/>
-              </a:rPr>
-              <a:t>, </a:t>
-            </a:r>
-            <a:r>
-              <a:rPr lang="en-US" sz="1600" dirty="0" err="1">
-                <a:latin typeface="Times New Roman" panose="02020603050405020304" pitchFamily="18" charset="0"/>
-                <a:cs typeface="Times New Roman" panose="02020603050405020304" pitchFamily="18" charset="0"/>
-              </a:rPr>
-              <a:t>países</a:t>
-            </a:r>
-            <a:r>
-              <a:rPr lang="en-US" sz="1600" dirty="0">
-                <a:latin typeface="Times New Roman" panose="02020603050405020304" pitchFamily="18" charset="0"/>
-                <a:cs typeface="Times New Roman" panose="02020603050405020304" pitchFamily="18" charset="0"/>
-              </a:rPr>
-              <a:t>, </a:t>
-            </a:r>
-            <a:r>
-              <a:rPr lang="en-US" sz="1600" dirty="0" err="1">
-                <a:latin typeface="Times New Roman" panose="02020603050405020304" pitchFamily="18" charset="0"/>
-                <a:cs typeface="Times New Roman" panose="02020603050405020304" pitchFamily="18" charset="0"/>
-              </a:rPr>
-              <a:t>métricas</a:t>
-            </a:r>
-            <a:r>
-              <a:rPr lang="en-US" sz="1600" dirty="0">
-                <a:latin typeface="Times New Roman" panose="02020603050405020304" pitchFamily="18" charset="0"/>
-                <a:cs typeface="Times New Roman" panose="02020603050405020304" pitchFamily="18" charset="0"/>
-              </a:rPr>
-              <a:t>, </a:t>
-            </a:r>
-            <a:r>
-              <a:rPr lang="en-US" sz="1600" dirty="0" err="1">
-                <a:latin typeface="Times New Roman" panose="02020603050405020304" pitchFamily="18" charset="0"/>
-                <a:cs typeface="Times New Roman" panose="02020603050405020304" pitchFamily="18" charset="0"/>
-              </a:rPr>
-              <a:t>tareas</a:t>
-            </a:r>
-            <a:r>
-              <a:rPr lang="en-US" sz="1600" dirty="0">
-                <a:latin typeface="Times New Roman" panose="02020603050405020304" pitchFamily="18" charset="0"/>
-                <a:cs typeface="Times New Roman" panose="02020603050405020304" pitchFamily="18" charset="0"/>
-              </a:rPr>
-              <a:t>) y sus </a:t>
-            </a:r>
-            <a:r>
-              <a:rPr lang="en-US" sz="1600" dirty="0" err="1">
-                <a:latin typeface="Times New Roman" panose="02020603050405020304" pitchFamily="18" charset="0"/>
-                <a:cs typeface="Times New Roman" panose="02020603050405020304" pitchFamily="18" charset="0"/>
-              </a:rPr>
-              <a:t>relaciones</a:t>
-            </a:r>
-            <a:r>
-              <a:rPr lang="en-US" sz="1600" dirty="0">
-                <a:latin typeface="Times New Roman" panose="02020603050405020304" pitchFamily="18" charset="0"/>
-                <a:cs typeface="Times New Roman" panose="02020603050405020304" pitchFamily="18" charset="0"/>
-              </a:rPr>
-              <a:t>.</a:t>
-            </a:r>
-          </a:p>
-          <a:p>
             <a:endParaRPr lang="en-US" sz="1600" dirty="0">
               <a:latin typeface="Times New Roman" panose="02020603050405020304" pitchFamily="18" charset="0"/>
               <a:cs typeface="Times New Roman" panose="02020603050405020304" pitchFamily="18" charset="0"/>
@@ -6707,7 +6088,7 @@
                 <a:latin typeface="Times New Roman" panose="02020603050405020304" pitchFamily="18" charset="0"/>
                 <a:cs typeface="Times New Roman" panose="02020603050405020304" pitchFamily="18" charset="0"/>
               </a:rPr>
-              <a:t>Aplicación de la técnica LLM-as-a-</a:t>
+              <a:t>Adaptar la técnica LLM-as-a-</a:t>
             </a:r>
             <a:r>
               <a:rPr lang="es-ES" sz="1600" dirty="0" err="1">
@@ -6721,13 +6102,41 @@
                 <a:latin typeface="Times New Roman" panose="02020603050405020304" pitchFamily="18" charset="0"/>
                 <a:cs typeface="Times New Roman" panose="02020603050405020304" pitchFamily="18" charset="0"/>
               </a:rPr>
-              <a:t> (Zheng et al., 2024), adecuada para preguntas amplias o temáticas donde no existe una respuesta “verdadera” (</a:t>
+              <a:t> (Zheng et al., 2024) a la construcción de conocimientos sobre inteligencia artificial abierta ( </a:t>
             </a:r>
             <a:r>
               <a:rPr lang="es-ES" sz="1600" dirty="0" err="1">
                 <a:latin typeface="Times New Roman" panose="02020603050405020304" pitchFamily="18" charset="0"/>
                 <a:cs typeface="Times New Roman" panose="02020603050405020304" pitchFamily="18" charset="0"/>
               </a:rPr>
+              <a:t>Hugging</a:t>
+            </a:r>
+            <a:r>
+              <a:rPr lang="es-ES" sz="1600" dirty="0">
+                <a:latin typeface="Times New Roman" panose="02020603050405020304" pitchFamily="18" charset="0"/>
+                <a:cs typeface="Times New Roman" panose="02020603050405020304" pitchFamily="18" charset="0"/>
+              </a:rPr>
+              <a:t> </a:t>
+            </a:r>
+            <a:r>
+              <a:rPr lang="es-ES" sz="1600" dirty="0" err="1">
+                <a:latin typeface="Times New Roman" panose="02020603050405020304" pitchFamily="18" charset="0"/>
+                <a:cs typeface="Times New Roman" panose="02020603050405020304" pitchFamily="18" charset="0"/>
+              </a:rPr>
+              <a:t>Face</a:t>
+            </a:r>
+            <a:r>
+              <a:rPr lang="es-ES" sz="1600" dirty="0">
+                <a:latin typeface="Times New Roman" panose="02020603050405020304" pitchFamily="18" charset="0"/>
+                <a:cs typeface="Times New Roman" panose="02020603050405020304" pitchFamily="18" charset="0"/>
+              </a:rPr>
+              <a:t>) para preguntas amplias o temáticas donde no existe una respuesta “completamente verdadera” (</a:t>
+            </a:r>
+            <a:r>
+              <a:rPr lang="es-ES" sz="1600" dirty="0" err="1">
+                <a:latin typeface="Times New Roman" panose="02020603050405020304" pitchFamily="18" charset="0"/>
+                <a:cs typeface="Times New Roman" panose="02020603050405020304" pitchFamily="18" charset="0"/>
+              </a:rPr>
               <a:t>ground</a:t>
             </a:r>
             <a:r>
@@ -6749,7 +6158,7 @@
                 <a:latin typeface="Times New Roman" panose="02020603050405020304" pitchFamily="18" charset="0"/>
                 <a:cs typeface="Times New Roman" panose="02020603050405020304" pitchFamily="18" charset="0"/>
               </a:rPr>
-              <a:t>). Esta metodología utiliza un primer LLM para generar un conjunto diverso de preguntas de </a:t>
+              <a:t>) a consultas. Esta metodología utiliza un primer LLM para generar un conjunto diverso de preguntas de </a:t>
             </a:r>
             <a:r>
               <a:rPr lang="es-ES" sz="1600" dirty="0" err="1">
@@ -6764,6 +6173,50 @@
                 <a:cs typeface="Times New Roman" panose="02020603050405020304" pitchFamily="18" charset="0"/>
               </a:rPr>
               <a:t> sobre un corpus específico, y un segundo LLM para evaluar las respuestas generadas según criterios predefinidos.</a:t>
+            </a:r>
+          </a:p>
+          <a:p>
+            <a:pPr marL="285750" indent="-285750">
+              <a:buFont typeface="Arial" panose="020B0604020202020204" pitchFamily="34" charset="0"/>
+              <a:buChar char="•"/>
+            </a:pPr>
+            <a:endParaRPr lang="es-ES" sz="1600" dirty="0">
+              <a:latin typeface="Times New Roman" panose="02020603050405020304" pitchFamily="18" charset="0"/>
+              <a:cs typeface="Times New Roman" panose="02020603050405020304" pitchFamily="18" charset="0"/>
+            </a:endParaRPr>
+          </a:p>
+          <a:p>
+            <a:pPr marL="285750" indent="-285750">
+              <a:buFont typeface="Arial" panose="020B0604020202020204" pitchFamily="34" charset="0"/>
+              <a:buChar char="•"/>
+            </a:pPr>
+            <a:r>
+              <a:rPr lang="es-ES" sz="1600" dirty="0">
+                <a:latin typeface="Times New Roman" panose="02020603050405020304" pitchFamily="18" charset="0"/>
+                <a:cs typeface="Times New Roman" panose="02020603050405020304" pitchFamily="18" charset="0"/>
+              </a:rPr>
+              <a:t>Documentar el procedimiento de construcción de conocimiento asociado a la base de datos de </a:t>
+            </a:r>
+            <a:r>
+              <a:rPr lang="es-ES" sz="1600" dirty="0" err="1">
+                <a:latin typeface="Times New Roman" panose="02020603050405020304" pitchFamily="18" charset="0"/>
+                <a:cs typeface="Times New Roman" panose="02020603050405020304" pitchFamily="18" charset="0"/>
+              </a:rPr>
+              <a:t>Hugging</a:t>
+            </a:r>
+            <a:r>
+              <a:rPr lang="es-ES" sz="1600" dirty="0">
+                <a:latin typeface="Times New Roman" panose="02020603050405020304" pitchFamily="18" charset="0"/>
+                <a:cs typeface="Times New Roman" panose="02020603050405020304" pitchFamily="18" charset="0"/>
+              </a:rPr>
+              <a:t> </a:t>
+            </a:r>
+            <a:r>
+              <a:rPr lang="es-ES" sz="1600" dirty="0" err="1">
+                <a:latin typeface="Times New Roman" panose="02020603050405020304" pitchFamily="18" charset="0"/>
+                <a:cs typeface="Times New Roman" panose="02020603050405020304" pitchFamily="18" charset="0"/>
+              </a:rPr>
+              <a:t>Face</a:t>
             </a:r>
             <a:endParaRPr lang="en-US" sz="1600" dirty="0">
               <a:latin typeface="Times New Roman" panose="02020603050405020304" pitchFamily="18" charset="0"/>
@@ -6805,7 +6258,7 @@
         <p:cNvPr id="1" name="">
           <a:extLst>
             <a:ext uri="{FF2B5EF4-FFF2-40B4-BE49-F238E27FC236}">
-              <a16:creationId xmlns:a16="http://schemas.microsoft.com/office/drawing/2014/main" id="{D0ED213A-0256-D22E-B5C4-B2FAD5CE8C27}"/>
+              <a16:creationId xmlns:a16="http://schemas.microsoft.com/office/drawing/2014/main" id="{F32BC386-A30F-909C-0EED-2B0D7487EEEA}"/>
             </a:ext>
           </a:extLst>
         </p:cNvPr>
@@ -6825,7 +6278,7 @@
           <p:cNvPr id="5" name="Rectangle 4">
             <a:extLst>
               <a:ext uri="{FF2B5EF4-FFF2-40B4-BE49-F238E27FC236}">
-                <a16:creationId xmlns:a16="http://schemas.microsoft.com/office/drawing/2014/main" id="{B105A4CB-F3F4-6333-9295-C537FF86D4A5}"/>
+                <a16:creationId xmlns:a16="http://schemas.microsoft.com/office/drawing/2014/main" id="{8BA727F1-5299-1D36-5FD2-A29B13CC3A6A}"/>
               </a:ext>
             </a:extLst>
           </p:cNvPr>
@@ -6871,7 +6324,7 @@
           <p:cNvPr id="4" name="Title 1">
             <a:extLst>
               <a:ext uri="{FF2B5EF4-FFF2-40B4-BE49-F238E27FC236}">
-                <a16:creationId xmlns:a16="http://schemas.microsoft.com/office/drawing/2014/main" id="{24223D96-15D7-461E-1B80-99AE80642075}"/>
+                <a16:creationId xmlns:a16="http://schemas.microsoft.com/office/drawing/2014/main" id="{619EBF3F-BE1C-64EB-94D9-D9FCEAF7E9A1}"/>
               </a:ext>
             </a:extLst>
           </p:cNvPr>
@@ -6882,8 +6335,8 @@
         </p:nvSpPr>
         <p:spPr>
           <a:xfrm>
-            <a:off x="602809" y="-204721"/>
-            <a:ext cx="6250663" cy="1043187"/>
+            <a:off x="602809" y="-140837"/>
+            <a:ext cx="5172547" cy="1043187"/>
           </a:xfrm>
           <a:prstGeom prst="rect">
             <a:avLst/>
@@ -6914,10 +6367,16 @@
           </a:lstStyle>
           <a:p>
             <a:r>
-              <a:rPr lang="en-US" dirty="0" err="1"/>
-              <a:t>Recursos</a:t>
-            </a:r>
-            <a:endParaRPr lang="en-US" dirty="0"/>
+              <a:rPr lang="en-US" sz="4800" dirty="0" err="1">
+                <a:latin typeface="Times New Roman" panose="02020603050405020304" pitchFamily="18" charset="0"/>
+                <a:cs typeface="Times New Roman" panose="02020603050405020304" pitchFamily="18" charset="0"/>
+              </a:rPr>
+              <a:t>Objetivos</a:t>
+            </a:r>
+            <a:endParaRPr lang="en-US" sz="4800" dirty="0">
+              <a:latin typeface="Times New Roman" panose="02020603050405020304" pitchFamily="18" charset="0"/>
+              <a:cs typeface="Times New Roman" panose="02020603050405020304" pitchFamily="18" charset="0"/>
+            </a:endParaRPr>
           </a:p>
         </p:txBody>
       </p:sp>
@@ -6926,7 +6385,7 @@
           <p:cNvPr id="6" name="Rectangle 5">
             <a:extLst>
               <a:ext uri="{FF2B5EF4-FFF2-40B4-BE49-F238E27FC236}">
-                <a16:creationId xmlns:a16="http://schemas.microsoft.com/office/drawing/2014/main" id="{68BE41EB-28C4-D3E1-351E-87AE598264C7}"/>
+                <a16:creationId xmlns:a16="http://schemas.microsoft.com/office/drawing/2014/main" id="{0F2C70F3-5FCE-552D-F1A4-6AEC1AB8ECC1}"/>
               </a:ext>
             </a:extLst>
           </p:cNvPr>
@@ -6972,7 +6431,7 @@
           <p:cNvPr id="7" name="Subtitle 2">
             <a:extLst>
               <a:ext uri="{FF2B5EF4-FFF2-40B4-BE49-F238E27FC236}">
-                <a16:creationId xmlns:a16="http://schemas.microsoft.com/office/drawing/2014/main" id="{BAFFE881-79C5-BBEA-DB60-3FA7792CD8F6}"/>
+                <a16:creationId xmlns:a16="http://schemas.microsoft.com/office/drawing/2014/main" id="{BD6A4A6C-1837-BDB4-0E46-4A377113A649}"/>
               </a:ext>
             </a:extLst>
           </p:cNvPr>
@@ -7162,7 +6621,7 @@
             <a:pPr algn="l"/>
             <a:r>
               <a:rPr lang="es-ES" sz="1400" dirty="0"/>
-              <a:t>5/7</a:t>
+              <a:t>4/7</a:t>
             </a:r>
             <a:endParaRPr lang="en-US" sz="1400" dirty="0"/>
           </a:p>
@@ -7173,7 +6632,7 @@
           <p:cNvPr id="9" name="Subtitle 2">
             <a:extLst>
               <a:ext uri="{FF2B5EF4-FFF2-40B4-BE49-F238E27FC236}">
-                <a16:creationId xmlns:a16="http://schemas.microsoft.com/office/drawing/2014/main" id="{EE05634F-1CB5-47FB-4725-5D5EA6CD1508}"/>
+                <a16:creationId xmlns:a16="http://schemas.microsoft.com/office/drawing/2014/main" id="{8FBC017A-7C8B-AF42-8C43-E5D118900A11}"/>
               </a:ext>
             </a:extLst>
           </p:cNvPr>
@@ -7184,8 +6643,8 @@
         </p:nvSpPr>
         <p:spPr>
           <a:xfrm>
-            <a:off x="602809" y="1164765"/>
-            <a:ext cx="9144000" cy="3832536"/>
+            <a:off x="602809" y="1560904"/>
+            <a:ext cx="9144000" cy="720384"/>
           </a:xfrm>
           <a:prstGeom prst="rect">
             <a:avLst/>
@@ -7360,83 +6819,59 @@
             </a:lvl9pPr>
           </a:lstStyle>
           <a:p>
-            <a:pPr marL="285750" lvl="0" indent="-285750" algn="l">
+            <a:pPr marL="285750" indent="-285750" algn="l">
               <a:buFont typeface="Arial" panose="020B0604020202020204" pitchFamily="34" charset="0"/>
               <a:buChar char="•"/>
             </a:pPr>
             <a:r>
-              <a:rPr lang="en-US" sz="1600" dirty="0">
-                <a:latin typeface="Times New Roman" panose="02020603050405020304" pitchFamily="18" charset="0"/>
-                <a:cs typeface="Times New Roman" panose="02020603050405020304" pitchFamily="18" charset="0"/>
-              </a:rPr>
-              <a:t>Neo4j</a:t>
-            </a:r>
-          </a:p>
-          <a:p>
-            <a:pPr marL="285750" lvl="0" indent="-285750" algn="l">
-              <a:buFont typeface="Arial" panose="020B0604020202020204" pitchFamily="34" charset="0"/>
-              <a:buChar char="•"/>
-            </a:pPr>
-            <a:r>
-              <a:rPr lang="en-US" sz="1600" dirty="0" err="1">
-                <a:latin typeface="Times New Roman" panose="02020603050405020304" pitchFamily="18" charset="0"/>
-                <a:cs typeface="Times New Roman" panose="02020603050405020304" pitchFamily="18" charset="0"/>
-              </a:rPr>
-              <a:t>Langchain</a:t>
-            </a:r>
-            <a:r>
-              <a:rPr lang="en-US" sz="1600" dirty="0">
+              <a:rPr lang="es-ES" sz="1600" dirty="0">
+                <a:latin typeface="Times New Roman" panose="02020603050405020304" pitchFamily="18" charset="0"/>
+                <a:cs typeface="Times New Roman" panose="02020603050405020304" pitchFamily="18" charset="0"/>
+              </a:rPr>
+              <a:t>Caracterizar el proceso de construcción de conocimiento sobre inteligencia artificial abierta utilizando </a:t>
+            </a:r>
+            <a:r>
+              <a:rPr lang="es-ES" sz="1600" dirty="0" err="1">
+                <a:latin typeface="Times New Roman" panose="02020603050405020304" pitchFamily="18" charset="0"/>
+                <a:cs typeface="Times New Roman" panose="02020603050405020304" pitchFamily="18" charset="0"/>
+              </a:rPr>
+              <a:t>Hugging</a:t>
+            </a:r>
+            <a:r>
+              <a:rPr lang="es-ES" sz="1600" dirty="0">
                 <a:latin typeface="Times New Roman" panose="02020603050405020304" pitchFamily="18" charset="0"/>
                 <a:cs typeface="Times New Roman" panose="02020603050405020304" pitchFamily="18" charset="0"/>
               </a:rPr>
               <a:t> </a:t>
             </a:r>
-          </a:p>
-          <a:p>
-            <a:pPr marL="285750" lvl="0" indent="-285750" algn="l">
-              <a:buFont typeface="Arial" panose="020B0604020202020204" pitchFamily="34" charset="0"/>
-              <a:buChar char="•"/>
-            </a:pPr>
-            <a:r>
-              <a:rPr lang="en-US" sz="1600" dirty="0">
-                <a:latin typeface="Times New Roman" panose="02020603050405020304" pitchFamily="18" charset="0"/>
-                <a:cs typeface="Times New Roman" panose="02020603050405020304" pitchFamily="18" charset="0"/>
-              </a:rPr>
-              <a:t>LLM API</a:t>
-            </a:r>
-          </a:p>
-          <a:p>
-            <a:pPr marL="285750" lvl="0" indent="-285750" algn="l">
-              <a:buFont typeface="Arial" panose="020B0604020202020204" pitchFamily="34" charset="0"/>
-              <a:buChar char="•"/>
-            </a:pPr>
-            <a:r>
-              <a:rPr lang="en-US" sz="1600" dirty="0">
-                <a:latin typeface="Times New Roman" panose="02020603050405020304" pitchFamily="18" charset="0"/>
-                <a:cs typeface="Times New Roman" panose="02020603050405020304" pitchFamily="18" charset="0"/>
-              </a:rPr>
-              <a:t>Dump file </a:t>
-            </a:r>
-            <a:r>
-              <a:rPr lang="en-US" sz="1600" dirty="0" err="1">
-                <a:latin typeface="Times New Roman" panose="02020603050405020304" pitchFamily="18" charset="0"/>
-                <a:cs typeface="Times New Roman" panose="02020603050405020304" pitchFamily="18" charset="0"/>
-              </a:rPr>
-              <a:t>HuggingFace</a:t>
-            </a:r>
-            <a:r>
-              <a:rPr lang="en-US" sz="1600" dirty="0">
-                <a:latin typeface="Times New Roman" panose="02020603050405020304" pitchFamily="18" charset="0"/>
-                <a:cs typeface="Times New Roman" panose="02020603050405020304" pitchFamily="18" charset="0"/>
-              </a:rPr>
-              <a:t> database</a:t>
-            </a:r>
-          </a:p>
-          <a:p>
-            <a:pPr marL="285750" lvl="0" indent="-285750" algn="l">
-              <a:buFont typeface="Arial" panose="020B0604020202020204" pitchFamily="34" charset="0"/>
-              <a:buChar char="•"/>
-            </a:pPr>
+            <a:r>
+              <a:rPr lang="es-ES" sz="1600" dirty="0" err="1">
+                <a:latin typeface="Times New Roman" panose="02020603050405020304" pitchFamily="18" charset="0"/>
+                <a:cs typeface="Times New Roman" panose="02020603050405020304" pitchFamily="18" charset="0"/>
+              </a:rPr>
+              <a:t>Face</a:t>
+            </a:r>
+            <a:r>
+              <a:rPr lang="es-ES" sz="1600" dirty="0">
+                <a:latin typeface="Times New Roman" panose="02020603050405020304" pitchFamily="18" charset="0"/>
+                <a:cs typeface="Times New Roman" panose="02020603050405020304" pitchFamily="18" charset="0"/>
+              </a:rPr>
+              <a:t> como base de datos y la tecnología </a:t>
+            </a:r>
+            <a:r>
+              <a:rPr lang="es-ES" sz="1600" dirty="0" err="1">
+                <a:latin typeface="Times New Roman" panose="02020603050405020304" pitchFamily="18" charset="0"/>
+                <a:cs typeface="Times New Roman" panose="02020603050405020304" pitchFamily="18" charset="0"/>
+              </a:rPr>
+              <a:t>GraphRAG</a:t>
+            </a:r>
+            <a:r>
+              <a:rPr lang="es-ES" sz="1600" dirty="0">
+                <a:latin typeface="Times New Roman" panose="02020603050405020304" pitchFamily="18" charset="0"/>
+                <a:cs typeface="Times New Roman" panose="02020603050405020304" pitchFamily="18" charset="0"/>
+              </a:rPr>
+              <a:t>. </a:t>
+            </a:r>
             <a:endParaRPr lang="en-US" sz="1600" dirty="0">
               <a:latin typeface="Times New Roman" panose="02020603050405020304" pitchFamily="18" charset="0"/>
               <a:cs typeface="Times New Roman" panose="02020603050405020304" pitchFamily="18" charset="0"/>
@@ -7444,10 +6879,67 @@
           </a:p>
         </p:txBody>
       </p:sp>
+      <p:sp>
+        <p:nvSpPr>
+          <p:cNvPr id="3" name="Title 1">
+            <a:extLst>
+              <a:ext uri="{FF2B5EF4-FFF2-40B4-BE49-F238E27FC236}">
+                <a16:creationId xmlns:a16="http://schemas.microsoft.com/office/drawing/2014/main" id="{C951A2A8-9FDE-27E2-206C-D7DBB8393F32}"/>
+              </a:ext>
+            </a:extLst>
+          </p:cNvPr>
+          <p:cNvSpPr txBox="1">
+            <a:spLocks/>
+          </p:cNvSpPr>
+          <p:nvPr/>
+        </p:nvSpPr>
+        <p:spPr>
+          <a:xfrm>
+            <a:off x="602809" y="902350"/>
+            <a:ext cx="1857588" cy="389947"/>
+          </a:xfrm>
+          <a:prstGeom prst="rect">
+            <a:avLst/>
+          </a:prstGeom>
+        </p:spPr>
+        <p:txBody>
+          <a:bodyPr vert="horz" lIns="91440" tIns="45720" rIns="91440" bIns="45720" rtlCol="0" anchor="ctr">
+            <a:normAutofit fontScale="92500" lnSpcReduction="20000"/>
+          </a:bodyPr>
+          <a:lstStyle>
+            <a:lvl1pPr algn="l" defTabSz="914400" rtl="0" eaLnBrk="1" latinLnBrk="0" hangingPunct="1">
+              <a:lnSpc>
+                <a:spcPct val="90000"/>
+              </a:lnSpc>
+              <a:spcBef>
+                <a:spcPct val="0"/>
+              </a:spcBef>
+              <a:buNone/>
+              <a:defRPr sz="4400" kern="1200">
+                <a:solidFill>
+                  <a:schemeClr val="tx1"/>
+                </a:solidFill>
+                <a:latin typeface="+mj-lt"/>
+                <a:ea typeface="+mj-ea"/>
+                <a:cs typeface="+mj-cs"/>
+              </a:defRPr>
+            </a:lvl1pPr>
+          </a:lstStyle>
+          <a:p>
+            <a:r>
+              <a:rPr lang="en-US" sz="2800" dirty="0">
+                <a:latin typeface="Times New Roman" panose="02020603050405020304" pitchFamily="18" charset="0"/>
+                <a:cs typeface="Times New Roman" panose="02020603050405020304" pitchFamily="18" charset="0"/>
+              </a:rPr>
+              <a:t>General:</a:t>
+            </a:r>
+          </a:p>
+        </p:txBody>
+      </p:sp>
     </p:spTree>
     <p:extLst>
       <p:ext uri="{BB962C8B-B14F-4D97-AF65-F5344CB8AC3E}">
-        <p14:creationId xmlns:p14="http://schemas.microsoft.com/office/powerpoint/2010/main" val="2169258637"/>
+        <p14:creationId xmlns:p14="http://schemas.microsoft.com/office/powerpoint/2010/main" val="3860318723"/>
       </p:ext>
     </p:extLst>
   </p:cSld>
@@ -7465,7 +6957,7 @@
         <p:cNvPr id="1" name="">
           <a:extLst>
             <a:ext uri="{FF2B5EF4-FFF2-40B4-BE49-F238E27FC236}">
-              <a16:creationId xmlns:a16="http://schemas.microsoft.com/office/drawing/2014/main" id="{9B86922D-5C91-6E31-34BD-B9657F2A565E}"/>
+              <a16:creationId xmlns:a16="http://schemas.microsoft.com/office/drawing/2014/main" id="{D0ED213A-0256-D22E-B5C4-B2FAD5CE8C27}"/>
             </a:ext>
           </a:extLst>
         </p:cNvPr>
@@ -7485,7 +6977,7 @@
           <p:cNvPr id="5" name="Rectangle 4">
             <a:extLst>
               <a:ext uri="{FF2B5EF4-FFF2-40B4-BE49-F238E27FC236}">
-                <a16:creationId xmlns:a16="http://schemas.microsoft.com/office/drawing/2014/main" id="{C536A68B-E901-5B1C-4537-06CED15C01B3}"/>
+                <a16:creationId xmlns:a16="http://schemas.microsoft.com/office/drawing/2014/main" id="{B105A4CB-F3F4-6333-9295-C537FF86D4A5}"/>
               </a:ext>
             </a:extLst>
           </p:cNvPr>
@@ -7531,7 +7023,7 @@
           <p:cNvPr id="4" name="Title 1">
             <a:extLst>
               <a:ext uri="{FF2B5EF4-FFF2-40B4-BE49-F238E27FC236}">
-                <a16:creationId xmlns:a16="http://schemas.microsoft.com/office/drawing/2014/main" id="{2A300E5D-DF61-A624-0110-3F03D6F1A539}"/>
+                <a16:creationId xmlns:a16="http://schemas.microsoft.com/office/drawing/2014/main" id="{24223D96-15D7-461E-1B80-99AE80642075}"/>
               </a:ext>
             </a:extLst>
           </p:cNvPr>
@@ -7575,7 +7067,7 @@
           <a:p>
             <a:r>
               <a:rPr lang="en-US" dirty="0" err="1"/>
-              <a:t>Referencias</a:t>
+              <a:t>Recursos</a:t>
             </a:r>
             <a:endParaRPr lang="en-US" dirty="0"/>
           </a:p>
@@ -7586,7 +7078,7 @@
           <p:cNvPr id="6" name="Rectangle 5">
             <a:extLst>
               <a:ext uri="{FF2B5EF4-FFF2-40B4-BE49-F238E27FC236}">
-                <a16:creationId xmlns:a16="http://schemas.microsoft.com/office/drawing/2014/main" id="{2479EF60-230F-7292-E808-4804E33BD0AC}"/>
+                <a16:creationId xmlns:a16="http://schemas.microsoft.com/office/drawing/2014/main" id="{68BE41EB-28C4-D3E1-351E-87AE598264C7}"/>
               </a:ext>
             </a:extLst>
           </p:cNvPr>
@@ -7632,6 +7124,666 @@
           <p:cNvPr id="7" name="Subtitle 2">
             <a:extLst>
               <a:ext uri="{FF2B5EF4-FFF2-40B4-BE49-F238E27FC236}">
+                <a16:creationId xmlns:a16="http://schemas.microsoft.com/office/drawing/2014/main" id="{BAFFE881-79C5-BBEA-DB60-3FA7792CD8F6}"/>
+              </a:ext>
+            </a:extLst>
+          </p:cNvPr>
+          <p:cNvSpPr txBox="1">
+            <a:spLocks/>
+          </p:cNvSpPr>
+          <p:nvPr/>
+        </p:nvSpPr>
+        <p:spPr>
+          <a:xfrm>
+            <a:off x="11633701" y="6504530"/>
+            <a:ext cx="558299" cy="295003"/>
+          </a:xfrm>
+          <a:prstGeom prst="rect">
+            <a:avLst/>
+          </a:prstGeom>
+        </p:spPr>
+        <p:txBody>
+          <a:bodyPr vert="horz" lIns="91440" tIns="45720" rIns="91440" bIns="45720" rtlCol="0">
+            <a:normAutofit/>
+          </a:bodyPr>
+          <a:lstStyle>
+            <a:lvl1pPr marL="0" indent="0" algn="ctr" defTabSz="914400" rtl="0" eaLnBrk="1" latinLnBrk="0" hangingPunct="1">
+              <a:lnSpc>
+                <a:spcPct val="90000"/>
+              </a:lnSpc>
+              <a:spcBef>
+                <a:spcPts val="1000"/>
+              </a:spcBef>
+              <a:buFont typeface="Arial" panose="020B0604020202020204" pitchFamily="34" charset="0"/>
+              <a:buNone/>
+              <a:defRPr sz="2400" kern="1200">
+                <a:solidFill>
+                  <a:schemeClr val="tx1"/>
+                </a:solidFill>
+                <a:latin typeface="+mn-lt"/>
+                <a:ea typeface="+mn-ea"/>
+                <a:cs typeface="+mn-cs"/>
+              </a:defRPr>
+            </a:lvl1pPr>
+            <a:lvl2pPr marL="457200" indent="0" algn="ctr" defTabSz="914400" rtl="0" eaLnBrk="1" latinLnBrk="0" hangingPunct="1">
+              <a:lnSpc>
+                <a:spcPct val="90000"/>
+              </a:lnSpc>
+              <a:spcBef>
+                <a:spcPts val="500"/>
+              </a:spcBef>
+              <a:buFont typeface="Arial" panose="020B0604020202020204" pitchFamily="34" charset="0"/>
+              <a:buNone/>
+              <a:defRPr sz="2000" kern="1200">
+                <a:solidFill>
+                  <a:schemeClr val="tx1"/>
+                </a:solidFill>
+                <a:latin typeface="+mn-lt"/>
+                <a:ea typeface="+mn-ea"/>
+                <a:cs typeface="+mn-cs"/>
+              </a:defRPr>
+            </a:lvl2pPr>
+            <a:lvl3pPr marL="914400" indent="0" algn="ctr" defTabSz="914400" rtl="0" eaLnBrk="1" latinLnBrk="0" hangingPunct="1">
+              <a:lnSpc>
+                <a:spcPct val="90000"/>
+              </a:lnSpc>
+              <a:spcBef>
+                <a:spcPts val="500"/>
+              </a:spcBef>
+              <a:buFont typeface="Arial" panose="020B0604020202020204" pitchFamily="34" charset="0"/>
+              <a:buNone/>
+              <a:defRPr sz="1800" kern="1200">
+                <a:solidFill>
+                  <a:schemeClr val="tx1"/>
+                </a:solidFill>
+                <a:latin typeface="+mn-lt"/>
+                <a:ea typeface="+mn-ea"/>
+                <a:cs typeface="+mn-cs"/>
+              </a:defRPr>
+            </a:lvl3pPr>
+            <a:lvl4pPr marL="1371600" indent="0" algn="ctr" defTabSz="914400" rtl="0" eaLnBrk="1" latinLnBrk="0" hangingPunct="1">
+              <a:lnSpc>
+                <a:spcPct val="90000"/>
+              </a:lnSpc>
+              <a:spcBef>
+                <a:spcPts val="500"/>
+              </a:spcBef>
+              <a:buFont typeface="Arial" panose="020B0604020202020204" pitchFamily="34" charset="0"/>
+              <a:buNone/>
+              <a:defRPr sz="1600" kern="1200">
+                <a:solidFill>
+                  <a:schemeClr val="tx1"/>
+                </a:solidFill>
+                <a:latin typeface="+mn-lt"/>
+                <a:ea typeface="+mn-ea"/>
+                <a:cs typeface="+mn-cs"/>
+              </a:defRPr>
+            </a:lvl4pPr>
+            <a:lvl5pPr marL="1828800" indent="0" algn="ctr" defTabSz="914400" rtl="0" eaLnBrk="1" latinLnBrk="0" hangingPunct="1">
+              <a:lnSpc>
+                <a:spcPct val="90000"/>
+              </a:lnSpc>
+              <a:spcBef>
+                <a:spcPts val="500"/>
+              </a:spcBef>
+              <a:buFont typeface="Arial" panose="020B0604020202020204" pitchFamily="34" charset="0"/>
+              <a:buNone/>
+              <a:defRPr sz="1600" kern="1200">
+                <a:solidFill>
+                  <a:schemeClr val="tx1"/>
+                </a:solidFill>
+                <a:latin typeface="+mn-lt"/>
+                <a:ea typeface="+mn-ea"/>
+                <a:cs typeface="+mn-cs"/>
+              </a:defRPr>
+            </a:lvl5pPr>
+            <a:lvl6pPr marL="2286000" indent="0" algn="ctr" defTabSz="914400" rtl="0" eaLnBrk="1" latinLnBrk="0" hangingPunct="1">
+              <a:lnSpc>
+                <a:spcPct val="90000"/>
+              </a:lnSpc>
+              <a:spcBef>
+                <a:spcPts val="500"/>
+              </a:spcBef>
+              <a:buFont typeface="Arial" panose="020B0604020202020204" pitchFamily="34" charset="0"/>
+              <a:buNone/>
+              <a:defRPr sz="1600" kern="1200">
+                <a:solidFill>
+                  <a:schemeClr val="tx1"/>
+                </a:solidFill>
+                <a:latin typeface="+mn-lt"/>
+                <a:ea typeface="+mn-ea"/>
+                <a:cs typeface="+mn-cs"/>
+              </a:defRPr>
+            </a:lvl6pPr>
+            <a:lvl7pPr marL="2743200" indent="0" algn="ctr" defTabSz="914400" rtl="0" eaLnBrk="1" latinLnBrk="0" hangingPunct="1">
+              <a:lnSpc>
+                <a:spcPct val="90000"/>
+              </a:lnSpc>
+              <a:spcBef>
+                <a:spcPts val="500"/>
+              </a:spcBef>
+              <a:buFont typeface="Arial" panose="020B0604020202020204" pitchFamily="34" charset="0"/>
+              <a:buNone/>
+              <a:defRPr sz="1600" kern="1200">
+                <a:solidFill>
+                  <a:schemeClr val="tx1"/>
+                </a:solidFill>
+                <a:latin typeface="+mn-lt"/>
+                <a:ea typeface="+mn-ea"/>
+                <a:cs typeface="+mn-cs"/>
+              </a:defRPr>
+            </a:lvl7pPr>
+            <a:lvl8pPr marL="3200400" indent="0" algn="ctr" defTabSz="914400" rtl="0" eaLnBrk="1" latinLnBrk="0" hangingPunct="1">
+              <a:lnSpc>
+                <a:spcPct val="90000"/>
+              </a:lnSpc>
+              <a:spcBef>
+                <a:spcPts val="500"/>
+              </a:spcBef>
+              <a:buFont typeface="Arial" panose="020B0604020202020204" pitchFamily="34" charset="0"/>
+              <a:buNone/>
+              <a:defRPr sz="1600" kern="1200">
+                <a:solidFill>
+                  <a:schemeClr val="tx1"/>
+                </a:solidFill>
+                <a:latin typeface="+mn-lt"/>
+                <a:ea typeface="+mn-ea"/>
+                <a:cs typeface="+mn-cs"/>
+              </a:defRPr>
+            </a:lvl8pPr>
+            <a:lvl9pPr marL="3657600" indent="0" algn="ctr" defTabSz="914400" rtl="0" eaLnBrk="1" latinLnBrk="0" hangingPunct="1">
+              <a:lnSpc>
+                <a:spcPct val="90000"/>
+              </a:lnSpc>
+              <a:spcBef>
+                <a:spcPts val="500"/>
+              </a:spcBef>
+              <a:buFont typeface="Arial" panose="020B0604020202020204" pitchFamily="34" charset="0"/>
+              <a:buNone/>
+              <a:defRPr sz="1600" kern="1200">
+                <a:solidFill>
+                  <a:schemeClr val="tx1"/>
+                </a:solidFill>
+                <a:latin typeface="+mn-lt"/>
+                <a:ea typeface="+mn-ea"/>
+                <a:cs typeface="+mn-cs"/>
+              </a:defRPr>
+            </a:lvl9pPr>
+          </a:lstStyle>
+          <a:p>
+            <a:pPr algn="l"/>
+            <a:r>
+              <a:rPr lang="es-ES" sz="1400" dirty="0"/>
+              <a:t>5/7</a:t>
+            </a:r>
+            <a:endParaRPr lang="en-US" sz="1400" dirty="0"/>
+          </a:p>
+        </p:txBody>
+      </p:sp>
+      <p:sp>
+        <p:nvSpPr>
+          <p:cNvPr id="9" name="Subtitle 2">
+            <a:extLst>
+              <a:ext uri="{FF2B5EF4-FFF2-40B4-BE49-F238E27FC236}">
+                <a16:creationId xmlns:a16="http://schemas.microsoft.com/office/drawing/2014/main" id="{EE05634F-1CB5-47FB-4725-5D5EA6CD1508}"/>
+              </a:ext>
+            </a:extLst>
+          </p:cNvPr>
+          <p:cNvSpPr txBox="1">
+            <a:spLocks/>
+          </p:cNvSpPr>
+          <p:nvPr/>
+        </p:nvSpPr>
+        <p:spPr>
+          <a:xfrm>
+            <a:off x="602809" y="1164765"/>
+            <a:ext cx="9144000" cy="3832536"/>
+          </a:xfrm>
+          <a:prstGeom prst="rect">
+            <a:avLst/>
+          </a:prstGeom>
+        </p:spPr>
+        <p:txBody>
+          <a:bodyPr vert="horz" lIns="91440" tIns="45720" rIns="91440" bIns="45720" rtlCol="0">
+            <a:noAutofit/>
+          </a:bodyPr>
+          <a:lstStyle>
+            <a:lvl1pPr marL="0" indent="0" algn="ctr" defTabSz="914400" rtl="0" eaLnBrk="1" latinLnBrk="0" hangingPunct="1">
+              <a:lnSpc>
+                <a:spcPct val="90000"/>
+              </a:lnSpc>
+              <a:spcBef>
+                <a:spcPts val="1000"/>
+              </a:spcBef>
+              <a:buFont typeface="Arial" panose="020B0604020202020204" pitchFamily="34" charset="0"/>
+              <a:buNone/>
+              <a:defRPr sz="2400" kern="1200">
+                <a:solidFill>
+                  <a:schemeClr val="tx1"/>
+                </a:solidFill>
+                <a:latin typeface="+mn-lt"/>
+                <a:ea typeface="+mn-ea"/>
+                <a:cs typeface="+mn-cs"/>
+              </a:defRPr>
+            </a:lvl1pPr>
+            <a:lvl2pPr marL="457200" indent="0" algn="ctr" defTabSz="914400" rtl="0" eaLnBrk="1" latinLnBrk="0" hangingPunct="1">
+              <a:lnSpc>
+                <a:spcPct val="90000"/>
+              </a:lnSpc>
+              <a:spcBef>
+                <a:spcPts val="500"/>
+              </a:spcBef>
+              <a:buFont typeface="Arial" panose="020B0604020202020204" pitchFamily="34" charset="0"/>
+              <a:buNone/>
+              <a:defRPr sz="2000" kern="1200">
+                <a:solidFill>
+                  <a:schemeClr val="tx1"/>
+                </a:solidFill>
+                <a:latin typeface="+mn-lt"/>
+                <a:ea typeface="+mn-ea"/>
+                <a:cs typeface="+mn-cs"/>
+              </a:defRPr>
+            </a:lvl2pPr>
+            <a:lvl3pPr marL="914400" indent="0" algn="ctr" defTabSz="914400" rtl="0" eaLnBrk="1" latinLnBrk="0" hangingPunct="1">
+              <a:lnSpc>
+                <a:spcPct val="90000"/>
+              </a:lnSpc>
+              <a:spcBef>
+                <a:spcPts val="500"/>
+              </a:spcBef>
+              <a:buFont typeface="Arial" panose="020B0604020202020204" pitchFamily="34" charset="0"/>
+              <a:buNone/>
+              <a:defRPr sz="1800" kern="1200">
+                <a:solidFill>
+                  <a:schemeClr val="tx1"/>
+                </a:solidFill>
+                <a:latin typeface="+mn-lt"/>
+                <a:ea typeface="+mn-ea"/>
+                <a:cs typeface="+mn-cs"/>
+              </a:defRPr>
+            </a:lvl3pPr>
+            <a:lvl4pPr marL="1371600" indent="0" algn="ctr" defTabSz="914400" rtl="0" eaLnBrk="1" latinLnBrk="0" hangingPunct="1">
+              <a:lnSpc>
+                <a:spcPct val="90000"/>
+              </a:lnSpc>
+              <a:spcBef>
+                <a:spcPts val="500"/>
+              </a:spcBef>
+              <a:buFont typeface="Arial" panose="020B0604020202020204" pitchFamily="34" charset="0"/>
+              <a:buNone/>
+              <a:defRPr sz="1600" kern="1200">
+                <a:solidFill>
+                  <a:schemeClr val="tx1"/>
+                </a:solidFill>
+                <a:latin typeface="+mn-lt"/>
+                <a:ea typeface="+mn-ea"/>
+                <a:cs typeface="+mn-cs"/>
+              </a:defRPr>
+            </a:lvl4pPr>
+            <a:lvl5pPr marL="1828800" indent="0" algn="ctr" defTabSz="914400" rtl="0" eaLnBrk="1" latinLnBrk="0" hangingPunct="1">
+              <a:lnSpc>
+                <a:spcPct val="90000"/>
+              </a:lnSpc>
+              <a:spcBef>
+                <a:spcPts val="500"/>
+              </a:spcBef>
+              <a:buFont typeface="Arial" panose="020B0604020202020204" pitchFamily="34" charset="0"/>
+              <a:buNone/>
+              <a:defRPr sz="1600" kern="1200">
+                <a:solidFill>
+                  <a:schemeClr val="tx1"/>
+                </a:solidFill>
+                <a:latin typeface="+mn-lt"/>
+                <a:ea typeface="+mn-ea"/>
+                <a:cs typeface="+mn-cs"/>
+              </a:defRPr>
+            </a:lvl5pPr>
+            <a:lvl6pPr marL="2286000" indent="0" algn="ctr" defTabSz="914400" rtl="0" eaLnBrk="1" latinLnBrk="0" hangingPunct="1">
+              <a:lnSpc>
+                <a:spcPct val="90000"/>
+              </a:lnSpc>
+              <a:spcBef>
+                <a:spcPts val="500"/>
+              </a:spcBef>
+              <a:buFont typeface="Arial" panose="020B0604020202020204" pitchFamily="34" charset="0"/>
+              <a:buNone/>
+              <a:defRPr sz="1600" kern="1200">
+                <a:solidFill>
+                  <a:schemeClr val="tx1"/>
+                </a:solidFill>
+                <a:latin typeface="+mn-lt"/>
+                <a:ea typeface="+mn-ea"/>
+                <a:cs typeface="+mn-cs"/>
+              </a:defRPr>
+            </a:lvl6pPr>
+            <a:lvl7pPr marL="2743200" indent="0" algn="ctr" defTabSz="914400" rtl="0" eaLnBrk="1" latinLnBrk="0" hangingPunct="1">
+              <a:lnSpc>
+                <a:spcPct val="90000"/>
+              </a:lnSpc>
+              <a:spcBef>
+                <a:spcPts val="500"/>
+              </a:spcBef>
+              <a:buFont typeface="Arial" panose="020B0604020202020204" pitchFamily="34" charset="0"/>
+              <a:buNone/>
+              <a:defRPr sz="1600" kern="1200">
+                <a:solidFill>
+                  <a:schemeClr val="tx1"/>
+                </a:solidFill>
+                <a:latin typeface="+mn-lt"/>
+                <a:ea typeface="+mn-ea"/>
+                <a:cs typeface="+mn-cs"/>
+              </a:defRPr>
+            </a:lvl7pPr>
+            <a:lvl8pPr marL="3200400" indent="0" algn="ctr" defTabSz="914400" rtl="0" eaLnBrk="1" latinLnBrk="0" hangingPunct="1">
+              <a:lnSpc>
+                <a:spcPct val="90000"/>
+              </a:lnSpc>
+              <a:spcBef>
+                <a:spcPts val="500"/>
+              </a:spcBef>
+              <a:buFont typeface="Arial" panose="020B0604020202020204" pitchFamily="34" charset="0"/>
+              <a:buNone/>
+              <a:defRPr sz="1600" kern="1200">
+                <a:solidFill>
+                  <a:schemeClr val="tx1"/>
+                </a:solidFill>
+                <a:latin typeface="+mn-lt"/>
+                <a:ea typeface="+mn-ea"/>
+                <a:cs typeface="+mn-cs"/>
+              </a:defRPr>
+            </a:lvl8pPr>
+            <a:lvl9pPr marL="3657600" indent="0" algn="ctr" defTabSz="914400" rtl="0" eaLnBrk="1" latinLnBrk="0" hangingPunct="1">
+              <a:lnSpc>
+                <a:spcPct val="90000"/>
+              </a:lnSpc>
+              <a:spcBef>
+                <a:spcPts val="500"/>
+              </a:spcBef>
+              <a:buFont typeface="Arial" panose="020B0604020202020204" pitchFamily="34" charset="0"/>
+              <a:buNone/>
+              <a:defRPr sz="1600" kern="1200">
+                <a:solidFill>
+                  <a:schemeClr val="tx1"/>
+                </a:solidFill>
+                <a:latin typeface="+mn-lt"/>
+                <a:ea typeface="+mn-ea"/>
+                <a:cs typeface="+mn-cs"/>
+              </a:defRPr>
+            </a:lvl9pPr>
+          </a:lstStyle>
+          <a:p>
+            <a:pPr marL="285750" lvl="0" indent="-285750" algn="l">
+              <a:buFont typeface="Arial" panose="020B0604020202020204" pitchFamily="34" charset="0"/>
+              <a:buChar char="•"/>
+            </a:pPr>
+            <a:r>
+              <a:rPr lang="en-US" sz="1600" dirty="0">
+                <a:latin typeface="Times New Roman" panose="02020603050405020304" pitchFamily="18" charset="0"/>
+                <a:cs typeface="Times New Roman" panose="02020603050405020304" pitchFamily="18" charset="0"/>
+              </a:rPr>
+              <a:t>Neo4j</a:t>
+            </a:r>
+          </a:p>
+          <a:p>
+            <a:pPr marL="285750" lvl="0" indent="-285750" algn="l">
+              <a:buFont typeface="Arial" panose="020B0604020202020204" pitchFamily="34" charset="0"/>
+              <a:buChar char="•"/>
+            </a:pPr>
+            <a:r>
+              <a:rPr lang="en-US" sz="1600" dirty="0" err="1">
+                <a:latin typeface="Times New Roman" panose="02020603050405020304" pitchFamily="18" charset="0"/>
+                <a:cs typeface="Times New Roman" panose="02020603050405020304" pitchFamily="18" charset="0"/>
+              </a:rPr>
+              <a:t>Langchain</a:t>
+            </a:r>
+            <a:r>
+              <a:rPr lang="en-US" sz="1600" dirty="0">
+                <a:latin typeface="Times New Roman" panose="02020603050405020304" pitchFamily="18" charset="0"/>
+                <a:cs typeface="Times New Roman" panose="02020603050405020304" pitchFamily="18" charset="0"/>
+              </a:rPr>
+              <a:t> </a:t>
+            </a:r>
+          </a:p>
+          <a:p>
+            <a:pPr marL="285750" lvl="0" indent="-285750" algn="l">
+              <a:buFont typeface="Arial" panose="020B0604020202020204" pitchFamily="34" charset="0"/>
+              <a:buChar char="•"/>
+            </a:pPr>
+            <a:r>
+              <a:rPr lang="en-US" sz="1600" dirty="0">
+                <a:latin typeface="Times New Roman" panose="02020603050405020304" pitchFamily="18" charset="0"/>
+                <a:cs typeface="Times New Roman" panose="02020603050405020304" pitchFamily="18" charset="0"/>
+              </a:rPr>
+              <a:t>LLM API</a:t>
+            </a:r>
+          </a:p>
+          <a:p>
+            <a:pPr marL="285750" lvl="0" indent="-285750" algn="l">
+              <a:buFont typeface="Arial" panose="020B0604020202020204" pitchFamily="34" charset="0"/>
+              <a:buChar char="•"/>
+            </a:pPr>
+            <a:r>
+              <a:rPr lang="en-US" sz="1600" dirty="0">
+                <a:latin typeface="Times New Roman" panose="02020603050405020304" pitchFamily="18" charset="0"/>
+                <a:cs typeface="Times New Roman" panose="02020603050405020304" pitchFamily="18" charset="0"/>
+              </a:rPr>
+              <a:t>Dump file </a:t>
+            </a:r>
+            <a:r>
+              <a:rPr lang="en-US" sz="1600" dirty="0" err="1">
+                <a:latin typeface="Times New Roman" panose="02020603050405020304" pitchFamily="18" charset="0"/>
+                <a:cs typeface="Times New Roman" panose="02020603050405020304" pitchFamily="18" charset="0"/>
+              </a:rPr>
+              <a:t>HuggingFace</a:t>
+            </a:r>
+            <a:r>
+              <a:rPr lang="en-US" sz="1600" dirty="0">
+                <a:latin typeface="Times New Roman" panose="02020603050405020304" pitchFamily="18" charset="0"/>
+                <a:cs typeface="Times New Roman" panose="02020603050405020304" pitchFamily="18" charset="0"/>
+              </a:rPr>
+              <a:t> database</a:t>
+            </a:r>
+          </a:p>
+          <a:p>
+            <a:pPr marL="285750" lvl="0" indent="-285750" algn="l">
+              <a:buFont typeface="Arial" panose="020B0604020202020204" pitchFamily="34" charset="0"/>
+              <a:buChar char="•"/>
+            </a:pPr>
+            <a:endParaRPr lang="en-US" sz="1600" dirty="0">
+              <a:latin typeface="Times New Roman" panose="02020603050405020304" pitchFamily="18" charset="0"/>
+              <a:cs typeface="Times New Roman" panose="02020603050405020304" pitchFamily="18" charset="0"/>
+            </a:endParaRPr>
+          </a:p>
+        </p:txBody>
+      </p:sp>
+    </p:spTree>
+    <p:extLst>
+      <p:ext uri="{BB962C8B-B14F-4D97-AF65-F5344CB8AC3E}">
+        <p14:creationId xmlns:p14="http://schemas.microsoft.com/office/powerpoint/2010/main" val="2169258637"/>
+      </p:ext>
+    </p:extLst>
+  </p:cSld>
+  <p:clrMapOvr>
+    <a:masterClrMapping/>
+  </p:clrMapOvr>
+</p:sld>
+</file>
+
+<file path=ppt/slides/slide7.xml><?xml version="1.0" encoding="utf-8"?>
+<p:sld xmlns:a="http://schemas.openxmlformats.org/drawingml/2006/main" xmlns:r="http://schemas.openxmlformats.org/officeDocument/2006/relationships" xmlns:p="http://schemas.openxmlformats.org/presentationml/2006/main">
+  <p:cSld>
+    <p:spTree>
+      <p:nvGrpSpPr>
+        <p:cNvPr id="1" name="">
+          <a:extLst>
+            <a:ext uri="{FF2B5EF4-FFF2-40B4-BE49-F238E27FC236}">
+              <a16:creationId xmlns:a16="http://schemas.microsoft.com/office/drawing/2014/main" id="{9B86922D-5C91-6E31-34BD-B9657F2A565E}"/>
+            </a:ext>
+          </a:extLst>
+        </p:cNvPr>
+        <p:cNvGrpSpPr/>
+        <p:nvPr/>
+      </p:nvGrpSpPr>
+      <p:grpSpPr>
+        <a:xfrm>
+          <a:off x="0" y="0"/>
+          <a:ext cx="0" cy="0"/>
+          <a:chOff x="0" y="0"/>
+          <a:chExt cx="0" cy="0"/>
+        </a:xfrm>
+      </p:grpSpPr>
+      <p:sp>
+        <p:nvSpPr>
+          <p:cNvPr id="5" name="Rectangle 4">
+            <a:extLst>
+              <a:ext uri="{FF2B5EF4-FFF2-40B4-BE49-F238E27FC236}">
+                <a16:creationId xmlns:a16="http://schemas.microsoft.com/office/drawing/2014/main" id="{C536A68B-E901-5B1C-4537-06CED15C01B3}"/>
+              </a:ext>
+            </a:extLst>
+          </p:cNvPr>
+          <p:cNvSpPr/>
+          <p:nvPr/>
+        </p:nvSpPr>
+        <p:spPr>
+          <a:xfrm>
+            <a:off x="0" y="2"/>
+            <a:ext cx="12192000" cy="633742"/>
+          </a:xfrm>
+          <a:prstGeom prst="rect">
+            <a:avLst/>
+          </a:prstGeom>
+        </p:spPr>
+        <p:style>
+          <a:lnRef idx="2">
+            <a:schemeClr val="accent6">
+              <a:shade val="15000"/>
+            </a:schemeClr>
+          </a:lnRef>
+          <a:fillRef idx="1">
+            <a:schemeClr val="accent6"/>
+          </a:fillRef>
+          <a:effectRef idx="0">
+            <a:schemeClr val="accent6"/>
+          </a:effectRef>
+          <a:fontRef idx="minor">
+            <a:schemeClr val="lt1"/>
+          </a:fontRef>
+        </p:style>
+        <p:txBody>
+          <a:bodyPr rtlCol="0" anchor="ctr"/>
+          <a:lstStyle/>
+          <a:p>
+            <a:pPr algn="ctr"/>
+            <a:endParaRPr lang="en-US"/>
+          </a:p>
+        </p:txBody>
+      </p:sp>
+      <p:sp>
+        <p:nvSpPr>
+          <p:cNvPr id="4" name="Title 1">
+            <a:extLst>
+              <a:ext uri="{FF2B5EF4-FFF2-40B4-BE49-F238E27FC236}">
+                <a16:creationId xmlns:a16="http://schemas.microsoft.com/office/drawing/2014/main" id="{2A300E5D-DF61-A624-0110-3F03D6F1A539}"/>
+              </a:ext>
+            </a:extLst>
+          </p:cNvPr>
+          <p:cNvSpPr txBox="1">
+            <a:spLocks/>
+          </p:cNvSpPr>
+          <p:nvPr/>
+        </p:nvSpPr>
+        <p:spPr>
+          <a:xfrm>
+            <a:off x="602809" y="-204721"/>
+            <a:ext cx="6250663" cy="1043187"/>
+          </a:xfrm>
+          <a:prstGeom prst="rect">
+            <a:avLst/>
+          </a:prstGeom>
+        </p:spPr>
+        <p:txBody>
+          <a:bodyPr vert="horz" lIns="91440" tIns="45720" rIns="91440" bIns="45720" rtlCol="0" anchor="ctr">
+            <a:normAutofit/>
+          </a:bodyPr>
+          <a:lstStyle>
+            <a:lvl1pPr algn="l" defTabSz="914400" rtl="0" eaLnBrk="1" latinLnBrk="0" hangingPunct="1">
+              <a:lnSpc>
+                <a:spcPct val="90000"/>
+              </a:lnSpc>
+              <a:spcBef>
+                <a:spcPct val="0"/>
+              </a:spcBef>
+              <a:buNone/>
+              <a:defRPr sz="4400" kern="1200">
+                <a:solidFill>
+                  <a:schemeClr val="tx1"/>
+                </a:solidFill>
+                <a:latin typeface="+mj-lt"/>
+                <a:ea typeface="+mj-ea"/>
+                <a:cs typeface="+mj-cs"/>
+              </a:defRPr>
+            </a:lvl1pPr>
+          </a:lstStyle>
+          <a:p>
+            <a:r>
+              <a:rPr lang="en-US" dirty="0" err="1"/>
+              <a:t>Referencias</a:t>
+            </a:r>
+            <a:endParaRPr lang="en-US" dirty="0"/>
+          </a:p>
+        </p:txBody>
+      </p:sp>
+      <p:sp>
+        <p:nvSpPr>
+          <p:cNvPr id="6" name="Rectangle 5">
+            <a:extLst>
+              <a:ext uri="{FF2B5EF4-FFF2-40B4-BE49-F238E27FC236}">
+                <a16:creationId xmlns:a16="http://schemas.microsoft.com/office/drawing/2014/main" id="{2479EF60-230F-7292-E808-4804E33BD0AC}"/>
+              </a:ext>
+            </a:extLst>
+          </p:cNvPr>
+          <p:cNvSpPr/>
+          <p:nvPr/>
+        </p:nvSpPr>
+        <p:spPr>
+          <a:xfrm>
+            <a:off x="0" y="6446066"/>
+            <a:ext cx="12192000" cy="411933"/>
+          </a:xfrm>
+          <a:prstGeom prst="rect">
+            <a:avLst/>
+          </a:prstGeom>
+        </p:spPr>
+        <p:style>
+          <a:lnRef idx="2">
+            <a:schemeClr val="accent6">
+              <a:shade val="15000"/>
+            </a:schemeClr>
+          </a:lnRef>
+          <a:fillRef idx="1">
+            <a:schemeClr val="accent6"/>
+          </a:fillRef>
+          <a:effectRef idx="0">
+            <a:schemeClr val="accent6"/>
+          </a:effectRef>
+          <a:fontRef idx="minor">
+            <a:schemeClr val="lt1"/>
+          </a:fontRef>
+        </p:style>
+        <p:txBody>
+          <a:bodyPr rtlCol="0" anchor="ctr"/>
+          <a:lstStyle/>
+          <a:p>
+            <a:pPr algn="ctr"/>
+            <a:endParaRPr lang="en-US"/>
+          </a:p>
+        </p:txBody>
+      </p:sp>
+      <p:sp>
+        <p:nvSpPr>
+          <p:cNvPr id="7" name="Subtitle 2">
+            <a:extLst>
+              <a:ext uri="{FF2B5EF4-FFF2-40B4-BE49-F238E27FC236}">
                 <a16:creationId xmlns:a16="http://schemas.microsoft.com/office/drawing/2014/main" id="{239CF082-435B-301B-C31C-957D8F70738E}"/>
               </a:ext>
             </a:extLst>
@@ -8390,7 +8542,7 @@
 </p:sld>
 </file>
 
-<file path=ppt/slides/slide7.xml><?xml version="1.0" encoding="utf-8"?>
+<file path=ppt/slides/slide8.xml><?xml version="1.0" encoding="utf-8"?>
 <p:sld xmlns:a="http://schemas.openxmlformats.org/drawingml/2006/main" xmlns:r="http://schemas.openxmlformats.org/officeDocument/2006/relationships" xmlns:p="http://schemas.openxmlformats.org/presentationml/2006/main">
   <p:cSld>
     <p:spTree>

</xml_diff>